<commit_message>
Atializacoes Diagramas revisao ALEX @virtohoho
</commit_message>
<xml_diff>
--- a/documentacao/arquitetura_LLD.pptx
+++ b/documentacao/arquitetura_LLD.pptx
@@ -259,7 +259,7 @@
           <a:p>
             <a:fld id="{DED8EB3A-AD80-4F0D-A0AC-02D3D51D9AC5}" type="datetimeFigureOut">
               <a:rPr lang="pt-BR" smtClean="0"/>
-              <a:t>09/04/2019</a:t>
+              <a:t>16/04/2019</a:t>
             </a:fld>
             <a:endParaRPr lang="pt-BR"/>
           </a:p>
@@ -457,7 +457,7 @@
           <a:p>
             <a:fld id="{DED8EB3A-AD80-4F0D-A0AC-02D3D51D9AC5}" type="datetimeFigureOut">
               <a:rPr lang="pt-BR" smtClean="0"/>
-              <a:t>09/04/2019</a:t>
+              <a:t>16/04/2019</a:t>
             </a:fld>
             <a:endParaRPr lang="pt-BR"/>
           </a:p>
@@ -665,7 +665,7 @@
           <a:p>
             <a:fld id="{DED8EB3A-AD80-4F0D-A0AC-02D3D51D9AC5}" type="datetimeFigureOut">
               <a:rPr lang="pt-BR" smtClean="0"/>
-              <a:t>09/04/2019</a:t>
+              <a:t>16/04/2019</a:t>
             </a:fld>
             <a:endParaRPr lang="pt-BR"/>
           </a:p>
@@ -863,7 +863,7 @@
           <a:p>
             <a:fld id="{DED8EB3A-AD80-4F0D-A0AC-02D3D51D9AC5}" type="datetimeFigureOut">
               <a:rPr lang="pt-BR" smtClean="0"/>
-              <a:t>09/04/2019</a:t>
+              <a:t>16/04/2019</a:t>
             </a:fld>
             <a:endParaRPr lang="pt-BR"/>
           </a:p>
@@ -1138,7 +1138,7 @@
           <a:p>
             <a:fld id="{DED8EB3A-AD80-4F0D-A0AC-02D3D51D9AC5}" type="datetimeFigureOut">
               <a:rPr lang="pt-BR" smtClean="0"/>
-              <a:t>09/04/2019</a:t>
+              <a:t>16/04/2019</a:t>
             </a:fld>
             <a:endParaRPr lang="pt-BR"/>
           </a:p>
@@ -1403,7 +1403,7 @@
           <a:p>
             <a:fld id="{DED8EB3A-AD80-4F0D-A0AC-02D3D51D9AC5}" type="datetimeFigureOut">
               <a:rPr lang="pt-BR" smtClean="0"/>
-              <a:t>09/04/2019</a:t>
+              <a:t>16/04/2019</a:t>
             </a:fld>
             <a:endParaRPr lang="pt-BR"/>
           </a:p>
@@ -1815,7 +1815,7 @@
           <a:p>
             <a:fld id="{DED8EB3A-AD80-4F0D-A0AC-02D3D51D9AC5}" type="datetimeFigureOut">
               <a:rPr lang="pt-BR" smtClean="0"/>
-              <a:t>09/04/2019</a:t>
+              <a:t>16/04/2019</a:t>
             </a:fld>
             <a:endParaRPr lang="pt-BR"/>
           </a:p>
@@ -1956,7 +1956,7 @@
           <a:p>
             <a:fld id="{DED8EB3A-AD80-4F0D-A0AC-02D3D51D9AC5}" type="datetimeFigureOut">
               <a:rPr lang="pt-BR" smtClean="0"/>
-              <a:t>09/04/2019</a:t>
+              <a:t>16/04/2019</a:t>
             </a:fld>
             <a:endParaRPr lang="pt-BR"/>
           </a:p>
@@ -2069,7 +2069,7 @@
           <a:p>
             <a:fld id="{DED8EB3A-AD80-4F0D-A0AC-02D3D51D9AC5}" type="datetimeFigureOut">
               <a:rPr lang="pt-BR" smtClean="0"/>
-              <a:t>09/04/2019</a:t>
+              <a:t>16/04/2019</a:t>
             </a:fld>
             <a:endParaRPr lang="pt-BR"/>
           </a:p>
@@ -2380,7 +2380,7 @@
           <a:p>
             <a:fld id="{DED8EB3A-AD80-4F0D-A0AC-02D3D51D9AC5}" type="datetimeFigureOut">
               <a:rPr lang="pt-BR" smtClean="0"/>
-              <a:t>09/04/2019</a:t>
+              <a:t>16/04/2019</a:t>
             </a:fld>
             <a:endParaRPr lang="pt-BR"/>
           </a:p>
@@ -2668,7 +2668,7 @@
           <a:p>
             <a:fld id="{DED8EB3A-AD80-4F0D-A0AC-02D3D51D9AC5}" type="datetimeFigureOut">
               <a:rPr lang="pt-BR" smtClean="0"/>
-              <a:t>09/04/2019</a:t>
+              <a:t>16/04/2019</a:t>
             </a:fld>
             <a:endParaRPr lang="pt-BR"/>
           </a:p>
@@ -2909,7 +2909,7 @@
           <a:p>
             <a:fld id="{DED8EB3A-AD80-4F0D-A0AC-02D3D51D9AC5}" type="datetimeFigureOut">
               <a:rPr lang="pt-BR" smtClean="0"/>
-              <a:t>09/04/2019</a:t>
+              <a:t>16/04/2019</a:t>
             </a:fld>
             <a:endParaRPr lang="pt-BR"/>
           </a:p>
@@ -3471,7 +3471,7 @@
           <p:nvPr/>
         </p:nvPicPr>
         <p:blipFill>
-          <a:blip r:embed="rId5">
+          <a:blip r:embed="rId5" cstate="hqprint">
             <a:extLst>
               <a:ext uri="{28A0092B-C50C-407E-A947-70E740481C1C}">
                 <a14:useLocalDpi xmlns:a14="http://schemas.microsoft.com/office/drawing/2010/main" val="0"/>
@@ -4235,8 +4235,8 @@
         </p:nvSpPr>
         <p:spPr>
           <a:xfrm>
-            <a:off x="3445168" y="1129123"/>
-            <a:ext cx="2678377" cy="769441"/>
+            <a:off x="3445168" y="1011585"/>
+            <a:ext cx="2678377" cy="938719"/>
           </a:xfrm>
           <a:prstGeom prst="rect">
             <a:avLst/>
@@ -4251,7 +4251,15 @@
           <a:p>
             <a:r>
               <a:rPr lang="pt-BR" sz="1100" dirty="0"/>
-              <a:t>Através das linguagens de programação, criamos as aplicações web e mobile, onde o cliente poderá ter acesso as suas informações, dados recolhidos e gráficos.</a:t>
+              <a:t>Através das linguagens de programação, criamos as aplicações web e </a:t>
+            </a:r>
+            <a:r>
+              <a:rPr lang="pt-BR" sz="1100" dirty="0" smtClean="0"/>
+              <a:t>mobile que serão acessadas através da internet, </a:t>
+            </a:r>
+            <a:r>
+              <a:rPr lang="pt-BR" sz="1100" dirty="0"/>
+              <a:t>onde o cliente poderá ter acesso as suas informações, dados recolhidos e gráficos.</a:t>
             </a:r>
           </a:p>
         </p:txBody>

</xml_diff>

<commit_message>
Atulizacao do diagrama e power point
</commit_message>
<xml_diff>
--- a/documentacao/arquitetura_LLD.pptx
+++ b/documentacao/arquitetura_LLD.pptx
@@ -243,7 +243,7 @@
           <a:p>
             <a:fld id="{DED8EB3A-AD80-4F0D-A0AC-02D3D51D9AC5}" type="datetimeFigureOut">
               <a:rPr lang="pt-BR" smtClean="0"/>
-              <a:t>22/04/2019</a:t>
+              <a:t>06/05/2019</a:t>
             </a:fld>
             <a:endParaRPr lang="pt-BR"/>
           </a:p>
@@ -413,7 +413,7 @@
           <a:p>
             <a:fld id="{DED8EB3A-AD80-4F0D-A0AC-02D3D51D9AC5}" type="datetimeFigureOut">
               <a:rPr lang="pt-BR" smtClean="0"/>
-              <a:t>22/04/2019</a:t>
+              <a:t>06/05/2019</a:t>
             </a:fld>
             <a:endParaRPr lang="pt-BR"/>
           </a:p>
@@ -593,7 +593,7 @@
           <a:p>
             <a:fld id="{DED8EB3A-AD80-4F0D-A0AC-02D3D51D9AC5}" type="datetimeFigureOut">
               <a:rPr lang="pt-BR" smtClean="0"/>
-              <a:t>22/04/2019</a:t>
+              <a:t>06/05/2019</a:t>
             </a:fld>
             <a:endParaRPr lang="pt-BR"/>
           </a:p>
@@ -763,7 +763,7 @@
           <a:p>
             <a:fld id="{DED8EB3A-AD80-4F0D-A0AC-02D3D51D9AC5}" type="datetimeFigureOut">
               <a:rPr lang="pt-BR" smtClean="0"/>
-              <a:t>22/04/2019</a:t>
+              <a:t>06/05/2019</a:t>
             </a:fld>
             <a:endParaRPr lang="pt-BR"/>
           </a:p>
@@ -1009,7 +1009,7 @@
           <a:p>
             <a:fld id="{DED8EB3A-AD80-4F0D-A0AC-02D3D51D9AC5}" type="datetimeFigureOut">
               <a:rPr lang="pt-BR" smtClean="0"/>
-              <a:t>22/04/2019</a:t>
+              <a:t>06/05/2019</a:t>
             </a:fld>
             <a:endParaRPr lang="pt-BR"/>
           </a:p>
@@ -1241,7 +1241,7 @@
           <a:p>
             <a:fld id="{DED8EB3A-AD80-4F0D-A0AC-02D3D51D9AC5}" type="datetimeFigureOut">
               <a:rPr lang="pt-BR" smtClean="0"/>
-              <a:t>22/04/2019</a:t>
+              <a:t>06/05/2019</a:t>
             </a:fld>
             <a:endParaRPr lang="pt-BR"/>
           </a:p>
@@ -1608,7 +1608,7 @@
           <a:p>
             <a:fld id="{DED8EB3A-AD80-4F0D-A0AC-02D3D51D9AC5}" type="datetimeFigureOut">
               <a:rPr lang="pt-BR" smtClean="0"/>
-              <a:t>22/04/2019</a:t>
+              <a:t>06/05/2019</a:t>
             </a:fld>
             <a:endParaRPr lang="pt-BR"/>
           </a:p>
@@ -1726,7 +1726,7 @@
           <a:p>
             <a:fld id="{DED8EB3A-AD80-4F0D-A0AC-02D3D51D9AC5}" type="datetimeFigureOut">
               <a:rPr lang="pt-BR" smtClean="0"/>
-              <a:t>22/04/2019</a:t>
+              <a:t>06/05/2019</a:t>
             </a:fld>
             <a:endParaRPr lang="pt-BR"/>
           </a:p>
@@ -1821,7 +1821,7 @@
           <a:p>
             <a:fld id="{DED8EB3A-AD80-4F0D-A0AC-02D3D51D9AC5}" type="datetimeFigureOut">
               <a:rPr lang="pt-BR" smtClean="0"/>
-              <a:t>22/04/2019</a:t>
+              <a:t>06/05/2019</a:t>
             </a:fld>
             <a:endParaRPr lang="pt-BR"/>
           </a:p>
@@ -2098,7 +2098,7 @@
           <a:p>
             <a:fld id="{DED8EB3A-AD80-4F0D-A0AC-02D3D51D9AC5}" type="datetimeFigureOut">
               <a:rPr lang="pt-BR" smtClean="0"/>
-              <a:t>22/04/2019</a:t>
+              <a:t>06/05/2019</a:t>
             </a:fld>
             <a:endParaRPr lang="pt-BR"/>
           </a:p>
@@ -2355,7 +2355,7 @@
           <a:p>
             <a:fld id="{DED8EB3A-AD80-4F0D-A0AC-02D3D51D9AC5}" type="datetimeFigureOut">
               <a:rPr lang="pt-BR" smtClean="0"/>
-              <a:t>22/04/2019</a:t>
+              <a:t>06/05/2019</a:t>
             </a:fld>
             <a:endParaRPr lang="pt-BR"/>
           </a:p>
@@ -2568,7 +2568,7 @@
           <a:p>
             <a:fld id="{DED8EB3A-AD80-4F0D-A0AC-02D3D51D9AC5}" type="datetimeFigureOut">
               <a:rPr lang="pt-BR" smtClean="0"/>
-              <a:t>22/04/2019</a:t>
+              <a:t>06/05/2019</a:t>
             </a:fld>
             <a:endParaRPr lang="pt-BR"/>
           </a:p>
@@ -2983,47 +2983,6 @@
       </p:grpSpPr>
       <p:pic>
         <p:nvPicPr>
-          <p:cNvPr id="11" name="Imagem 10">
-            <a:extLst>
-              <a:ext uri="{FF2B5EF4-FFF2-40B4-BE49-F238E27FC236}">
-                <a16:creationId xmlns:a16="http://schemas.microsoft.com/office/drawing/2014/main" id="{6D2A3A96-BA9C-46FD-BBF5-54C8CD9E5887}"/>
-              </a:ext>
-            </a:extLst>
-          </p:cNvPr>
-          <p:cNvPicPr>
-            <a:picLocks noChangeAspect="1"/>
-          </p:cNvPicPr>
-          <p:nvPr/>
-        </p:nvPicPr>
-        <p:blipFill rotWithShape="1">
-          <a:blip r:embed="rId2">
-            <a:extLst>
-              <a:ext uri="{BEBA8EAE-BF5A-486C-A8C5-ECC9F3942E4B}">
-                <a14:imgProps xmlns:a14="http://schemas.microsoft.com/office/drawing/2010/main">
-                  <a14:imgLayer r:embed="rId3">
-                    <a14:imgEffect>
-                      <a14:backgroundRemoval t="10000" b="90000" l="6875" r="90000"/>
-                    </a14:imgEffect>
-                  </a14:imgLayer>
-                </a14:imgProps>
-              </a:ext>
-            </a:extLst>
-          </a:blip>
-          <a:srcRect l="7454" t="20869" r="8825" b="21276"/>
-          <a:stretch/>
-        </p:blipFill>
-        <p:spPr>
-          <a:xfrm>
-            <a:off x="440266" y="4775199"/>
-            <a:ext cx="6214533" cy="3911601"/>
-          </a:xfrm>
-          <a:prstGeom prst="rect">
-            <a:avLst/>
-          </a:prstGeom>
-        </p:spPr>
-      </p:pic>
-      <p:pic>
-        <p:nvPicPr>
           <p:cNvPr id="109" name="Imagem 108"/>
           <p:cNvPicPr>
             <a:picLocks noChangeAspect="1"/>
@@ -3031,11 +2990,11 @@
           <p:nvPr/>
         </p:nvPicPr>
         <p:blipFill>
-          <a:blip r:embed="rId4">
+          <a:blip r:embed="rId2">
             <a:extLst>
               <a:ext uri="{BEBA8EAE-BF5A-486C-A8C5-ECC9F3942E4B}">
                 <a14:imgProps xmlns:a14="http://schemas.microsoft.com/office/drawing/2010/main">
-                  <a14:imgLayer r:embed="rId5">
+                  <a14:imgLayer r:embed="rId3">
                     <a14:imgEffect>
                       <a14:backgroundRemoval t="536" b="100000" l="0" r="99667">
                         <a14:foregroundMark x1="7667" y1="11429" x2="8778" y2="25000"/>
@@ -3063,8 +3022,8 @@
         </p:blipFill>
         <p:spPr>
           <a:xfrm>
-            <a:off x="2546634" y="5620823"/>
-            <a:ext cx="1672818" cy="1040864"/>
+            <a:off x="9360820" y="231580"/>
+            <a:ext cx="4618644" cy="2873822"/>
           </a:xfrm>
           <a:prstGeom prst="rect">
             <a:avLst/>
@@ -3086,7 +3045,7 @@
           <p:nvPr/>
         </p:nvPicPr>
         <p:blipFill>
-          <a:blip r:embed="rId6">
+          <a:blip r:embed="rId4">
             <a:extLst>
               <a:ext uri="{28A0092B-C50C-407E-A947-70E740481C1C}">
                 <a14:useLocalDpi xmlns:a14="http://schemas.microsoft.com/office/drawing/2010/main" val="0"/>
@@ -3100,8 +3059,8 @@
         </p:blipFill>
         <p:spPr bwMode="auto">
           <a:xfrm>
-            <a:off x="7349861" y="10753593"/>
-            <a:ext cx="2405384" cy="1239981"/>
+            <a:off x="12018877" y="11706382"/>
+            <a:ext cx="2942617" cy="1516926"/>
           </a:xfrm>
           <a:prstGeom prst="rect">
             <a:avLst/>
@@ -3119,46 +3078,6 @@
           <a:extLst/>
         </p:spPr>
       </p:pic>
-      <p:cxnSp>
-        <p:nvCxnSpPr>
-          <p:cNvPr id="7" name="Conector de Seta Reta 6">
-            <a:extLst>
-              <a:ext uri="{FF2B5EF4-FFF2-40B4-BE49-F238E27FC236}">
-                <a16:creationId xmlns:a16="http://schemas.microsoft.com/office/drawing/2014/main" id="{026327FF-F533-4EE7-A29C-8AAE39A505EA}"/>
-              </a:ext>
-            </a:extLst>
-          </p:cNvPr>
-          <p:cNvCxnSpPr/>
-          <p:nvPr/>
-        </p:nvCxnSpPr>
-        <p:spPr>
-          <a:xfrm>
-            <a:off x="9835482" y="11291452"/>
-            <a:ext cx="1765167" cy="0"/>
-          </a:xfrm>
-          <a:prstGeom prst="straightConnector1">
-            <a:avLst/>
-          </a:prstGeom>
-          <a:ln>
-            <a:headEnd type="triangle"/>
-            <a:tailEnd type="triangle"/>
-          </a:ln>
-        </p:spPr>
-        <p:style>
-          <a:lnRef idx="3">
-            <a:schemeClr val="dk1"/>
-          </a:lnRef>
-          <a:fillRef idx="0">
-            <a:schemeClr val="dk1"/>
-          </a:fillRef>
-          <a:effectRef idx="2">
-            <a:schemeClr val="dk1"/>
-          </a:effectRef>
-          <a:fontRef idx="minor">
-            <a:schemeClr val="tx1"/>
-          </a:fontRef>
-        </p:style>
-      </p:cxnSp>
       <p:pic>
         <p:nvPicPr>
           <p:cNvPr id="3084" name="Picture 12" descr="Resultado de imagem para logotipo de css">
@@ -3174,7 +3093,7 @@
           <p:nvPr/>
         </p:nvPicPr>
         <p:blipFill>
-          <a:blip r:embed="rId7" cstate="hqprint">
+          <a:blip r:embed="rId5" cstate="hqprint">
             <a:extLst>
               <a:ext uri="{28A0092B-C50C-407E-A947-70E740481C1C}">
                 <a14:useLocalDpi xmlns:a14="http://schemas.microsoft.com/office/drawing/2010/main" val="0"/>
@@ -3188,8 +3107,8 @@
         </p:blipFill>
         <p:spPr bwMode="auto">
           <a:xfrm>
-            <a:off x="2695404" y="5667700"/>
-            <a:ext cx="1311056" cy="766844"/>
+            <a:off x="9942145" y="319240"/>
+            <a:ext cx="3455993" cy="2021430"/>
           </a:xfrm>
           <a:prstGeom prst="rect">
             <a:avLst/>
@@ -3221,11 +3140,11 @@
           <p:nvPr/>
         </p:nvPicPr>
         <p:blipFill>
-          <a:blip r:embed="rId8">
+          <a:blip r:embed="rId6">
             <a:extLst>
               <a:ext uri="{BEBA8EAE-BF5A-486C-A8C5-ECC9F3942E4B}">
                 <a14:imgProps xmlns:a14="http://schemas.microsoft.com/office/drawing/2010/main">
-                  <a14:imgLayer r:embed="rId9">
+                  <a14:imgLayer r:embed="rId7">
                     <a14:imgEffect>
                       <a14:backgroundRemoval t="10000" b="90000" l="10000" r="90000">
                         <a14:foregroundMark x1="41196" y1="53293" x2="41196" y2="53293"/>
@@ -3246,8 +3165,8 @@
         </p:blipFill>
         <p:spPr bwMode="auto">
           <a:xfrm>
-            <a:off x="3540053" y="6839378"/>
-            <a:ext cx="999944" cy="554786"/>
+            <a:off x="3433702" y="4228313"/>
+            <a:ext cx="3026416" cy="1679107"/>
           </a:xfrm>
           <a:prstGeom prst="rect">
             <a:avLst/>
@@ -3278,8 +3197,8 @@
         </p:nvSpPr>
         <p:spPr>
           <a:xfrm>
-            <a:off x="2095173" y="11937978"/>
-            <a:ext cx="1999395" cy="461665"/>
+            <a:off x="4357808" y="12840842"/>
+            <a:ext cx="2141408" cy="461665"/>
           </a:xfrm>
           <a:prstGeom prst="rect">
             <a:avLst/>
@@ -3287,12 +3206,12 @@
           <a:noFill/>
         </p:spPr>
         <p:txBody>
-          <a:bodyPr wrap="none" lIns="91440" tIns="45720" rIns="91440" bIns="45720">
+          <a:bodyPr wrap="square" lIns="91440" tIns="45720" rIns="91440" bIns="45720">
             <a:spAutoFit/>
           </a:bodyPr>
           <a:lstStyle/>
           <a:p>
-            <a:pPr algn="ctr"/>
+            <a:pPr algn="just"/>
             <a:r>
               <a:rPr lang="pt-BR" sz="2400" dirty="0" err="1">
                 <a:ln w="0"/>
@@ -3344,13 +3263,16 @@
         </p:nvCxnSpPr>
         <p:spPr>
           <a:xfrm>
-            <a:off x="6824621" y="7186573"/>
-            <a:ext cx="4570591" cy="29378"/>
+            <a:off x="14339438" y="3733793"/>
+            <a:ext cx="1597248" cy="1154728"/>
           </a:xfrm>
           <a:prstGeom prst="straightConnector1">
             <a:avLst/>
           </a:prstGeom>
-          <a:ln>
+          <a:ln w="76200">
+            <a:solidFill>
+              <a:schemeClr val="tx1"/>
+            </a:solidFill>
             <a:tailEnd type="triangle"/>
           </a:ln>
         </p:spPr>
@@ -3384,7 +3306,7 @@
           <p:nvPr/>
         </p:nvPicPr>
         <p:blipFill>
-          <a:blip r:embed="rId10">
+          <a:blip r:embed="rId8">
             <a:extLst>
               <a:ext uri="{28A0092B-C50C-407E-A947-70E740481C1C}">
                 <a14:useLocalDpi xmlns:a14="http://schemas.microsoft.com/office/drawing/2010/main" val="0"/>
@@ -3398,8 +3320,8 @@
         </p:blipFill>
         <p:spPr bwMode="auto">
           <a:xfrm>
-            <a:off x="11309554" y="5532562"/>
-            <a:ext cx="3259973" cy="2629638"/>
+            <a:off x="20132842" y="4869774"/>
+            <a:ext cx="3450392" cy="2783238"/>
           </a:xfrm>
           <a:prstGeom prst="rect">
             <a:avLst/>
@@ -3413,90 +3335,6 @@
           <a:extLst/>
         </p:spPr>
       </p:pic>
-      <p:cxnSp>
-        <p:nvCxnSpPr>
-          <p:cNvPr id="26" name="Conector de Seta Reta 25">
-            <a:extLst>
-              <a:ext uri="{FF2B5EF4-FFF2-40B4-BE49-F238E27FC236}">
-                <a16:creationId xmlns:a16="http://schemas.microsoft.com/office/drawing/2014/main" id="{F9311CF2-1330-48A9-9EB1-D1672C80B244}"/>
-              </a:ext>
-            </a:extLst>
-          </p:cNvPr>
-          <p:cNvCxnSpPr>
-            <a:cxnSpLocks/>
-          </p:cNvCxnSpPr>
-          <p:nvPr/>
-        </p:nvCxnSpPr>
-        <p:spPr>
-          <a:xfrm flipH="1">
-            <a:off x="6146108" y="11427427"/>
-            <a:ext cx="1106085" cy="5818"/>
-          </a:xfrm>
-          <a:prstGeom prst="straightConnector1">
-            <a:avLst/>
-          </a:prstGeom>
-          <a:ln>
-            <a:headEnd type="triangle"/>
-            <a:tailEnd type="triangle"/>
-          </a:ln>
-        </p:spPr>
-        <p:style>
-          <a:lnRef idx="3">
-            <a:schemeClr val="dk1"/>
-          </a:lnRef>
-          <a:fillRef idx="0">
-            <a:schemeClr val="dk1"/>
-          </a:fillRef>
-          <a:effectRef idx="2">
-            <a:schemeClr val="dk1"/>
-          </a:effectRef>
-          <a:fontRef idx="minor">
-            <a:schemeClr val="tx1"/>
-          </a:fontRef>
-        </p:style>
-      </p:cxnSp>
-      <p:cxnSp>
-        <p:nvCxnSpPr>
-          <p:cNvPr id="29" name="Conector de Seta Reta 28">
-            <a:extLst>
-              <a:ext uri="{FF2B5EF4-FFF2-40B4-BE49-F238E27FC236}">
-                <a16:creationId xmlns:a16="http://schemas.microsoft.com/office/drawing/2014/main" id="{F0F5B4BB-F2C5-41F2-90AF-92FF4CC71BA3}"/>
-              </a:ext>
-            </a:extLst>
-          </p:cNvPr>
-          <p:cNvCxnSpPr>
-            <a:cxnSpLocks/>
-          </p:cNvCxnSpPr>
-          <p:nvPr/>
-        </p:nvCxnSpPr>
-        <p:spPr>
-          <a:xfrm flipV="1">
-            <a:off x="2481990" y="8735119"/>
-            <a:ext cx="14194" cy="1066514"/>
-          </a:xfrm>
-          <a:prstGeom prst="straightConnector1">
-            <a:avLst/>
-          </a:prstGeom>
-          <a:ln>
-            <a:headEnd type="triangle"/>
-            <a:tailEnd type="triangle"/>
-          </a:ln>
-        </p:spPr>
-        <p:style>
-          <a:lnRef idx="3">
-            <a:schemeClr val="dk1"/>
-          </a:lnRef>
-          <a:fillRef idx="0">
-            <a:schemeClr val="dk1"/>
-          </a:fillRef>
-          <a:effectRef idx="2">
-            <a:schemeClr val="dk1"/>
-          </a:effectRef>
-          <a:fontRef idx="minor">
-            <a:schemeClr val="tx1"/>
-          </a:fontRef>
-        </p:style>
-      </p:cxnSp>
       <p:sp>
         <p:nvSpPr>
           <p:cNvPr id="6" name="Retângulo 5">
@@ -3511,8 +3349,8 @@
         </p:nvSpPr>
         <p:spPr>
           <a:xfrm>
-            <a:off x="11395212" y="11016661"/>
-            <a:ext cx="2683747" cy="1384995"/>
+            <a:off x="17679855" y="11514898"/>
+            <a:ext cx="2612935" cy="1815882"/>
           </a:xfrm>
           <a:prstGeom prst="rect">
             <a:avLst/>
@@ -3520,12 +3358,12 @@
           <a:noFill/>
         </p:spPr>
         <p:txBody>
-          <a:bodyPr wrap="none" lIns="91440" tIns="45720" rIns="91440" bIns="45720">
+          <a:bodyPr wrap="square" lIns="91440" tIns="45720" rIns="91440" bIns="45720">
             <a:spAutoFit/>
           </a:bodyPr>
           <a:lstStyle/>
           <a:p>
-            <a:pPr algn="ctr"/>
+            <a:pPr algn="just"/>
             <a:r>
               <a:rPr lang="pt-BR" sz="2800" dirty="0">
                 <a:ln w="0"/>
@@ -3544,7 +3382,7 @@
             </a:r>
           </a:p>
           <a:p>
-            <a:pPr algn="ctr"/>
+            <a:pPr algn="just"/>
             <a:r>
               <a:rPr lang="pt-BR" sz="2800" dirty="0">
                 <a:ln w="0"/>
@@ -3563,7 +3401,7 @@
             </a:r>
           </a:p>
           <a:p>
-            <a:pPr algn="ctr"/>
+            <a:pPr algn="just"/>
             <a:r>
               <a:rPr lang="pt-BR" sz="2800" dirty="0">
                 <a:ln w="0"/>
@@ -3597,8 +3435,8 @@
         </p:nvSpPr>
         <p:spPr>
           <a:xfrm>
-            <a:off x="6981248" y="11966577"/>
-            <a:ext cx="3234155" cy="461665"/>
+            <a:off x="11957249" y="13218800"/>
+            <a:ext cx="3463870" cy="461665"/>
           </a:xfrm>
           <a:prstGeom prst="rect">
             <a:avLst/>
@@ -3606,12 +3444,12 @@
           <a:noFill/>
         </p:spPr>
         <p:txBody>
-          <a:bodyPr wrap="none" lIns="91440" tIns="45720" rIns="91440" bIns="45720">
+          <a:bodyPr wrap="square" lIns="91440" tIns="45720" rIns="91440" bIns="45720">
             <a:spAutoFit/>
           </a:bodyPr>
           <a:lstStyle/>
           <a:p>
-            <a:pPr algn="ctr"/>
+            <a:pPr algn="just"/>
             <a:r>
               <a:rPr lang="pt-BR" sz="2400" dirty="0">
                 <a:ln w="0"/>
@@ -3645,8 +3483,8 @@
         </p:nvSpPr>
         <p:spPr>
           <a:xfrm>
-            <a:off x="11991725" y="7789421"/>
-            <a:ext cx="1494072" cy="523220"/>
+            <a:off x="21178266" y="7274781"/>
+            <a:ext cx="1547201" cy="530926"/>
           </a:xfrm>
           <a:prstGeom prst="rect">
             <a:avLst/>
@@ -3659,7 +3497,7 @@
           </a:bodyPr>
           <a:lstStyle/>
           <a:p>
-            <a:pPr algn="ctr"/>
+            <a:pPr algn="just"/>
             <a:r>
               <a:rPr lang="pt-BR" sz="2800" dirty="0">
                 <a:ln w="0"/>
@@ -3707,11 +3545,11 @@
           <p:nvPr/>
         </p:nvPicPr>
         <p:blipFill>
-          <a:blip r:embed="rId11" cstate="hqprint">
+          <a:blip r:embed="rId9" cstate="hqprint">
             <a:extLst>
               <a:ext uri="{BEBA8EAE-BF5A-486C-A8C5-ECC9F3942E4B}">
                 <a14:imgProps xmlns:a14="http://schemas.microsoft.com/office/drawing/2010/main">
-                  <a14:imgLayer r:embed="rId12">
+                  <a14:imgLayer r:embed="rId10">
                     <a14:imgEffect>
                       <a14:backgroundRemoval t="10000" b="90000" l="400" r="100000">
                         <a14:foregroundMark x1="13000" y1="55000" x2="12200" y2="64800"/>
@@ -3733,8 +3571,8 @@
         </p:blipFill>
         <p:spPr bwMode="auto">
           <a:xfrm>
-            <a:off x="2546634" y="10632870"/>
-            <a:ext cx="1124861" cy="1124861"/>
+            <a:off x="4480019" y="11494317"/>
+            <a:ext cx="1456600" cy="1456600"/>
           </a:xfrm>
           <a:prstGeom prst="rect">
             <a:avLst/>
@@ -3766,11 +3604,11 @@
           <p:nvPr/>
         </p:nvPicPr>
         <p:blipFill>
-          <a:blip r:embed="rId13">
+          <a:blip r:embed="rId11">
             <a:extLst>
               <a:ext uri="{BEBA8EAE-BF5A-486C-A8C5-ECC9F3942E4B}">
                 <a14:imgProps xmlns:a14="http://schemas.microsoft.com/office/drawing/2010/main">
-                  <a14:imgLayer r:embed="rId14">
+                  <a14:imgLayer r:embed="rId12">
                     <a14:imgEffect>
                       <a14:backgroundRemoval t="0" b="100000" l="0" r="100000">
                         <a14:foregroundMark x1="43000" y1="21645" x2="84000" y2="39394"/>
@@ -3787,8 +3625,8 @@
         </p:blipFill>
         <p:spPr>
           <a:xfrm>
-            <a:off x="3249612" y="7484287"/>
-            <a:ext cx="528371" cy="610268"/>
+            <a:off x="5663935" y="6149149"/>
+            <a:ext cx="1536962" cy="1775189"/>
           </a:xfrm>
           <a:prstGeom prst="rect">
             <a:avLst/>
@@ -3810,11 +3648,11 @@
           <p:nvPr/>
         </p:nvPicPr>
         <p:blipFill>
-          <a:blip r:embed="rId15">
+          <a:blip r:embed="rId13">
             <a:extLst>
               <a:ext uri="{BEBA8EAE-BF5A-486C-A8C5-ECC9F3942E4B}">
                 <a14:imgProps xmlns:a14="http://schemas.microsoft.com/office/drawing/2010/main">
-                  <a14:imgLayer r:embed="rId16">
+                  <a14:imgLayer r:embed="rId14">
                     <a14:imgEffect>
                       <a14:backgroundRemoval t="0" b="96933" l="0" r="100000">
                         <a14:foregroundMark x1="5025" y1="86503" x2="91960" y2="90798"/>
@@ -3833,8 +3671,8 @@
         </p:blipFill>
         <p:spPr>
           <a:xfrm>
-            <a:off x="2496184" y="6774823"/>
-            <a:ext cx="670625" cy="549306"/>
+            <a:off x="2326535" y="5825393"/>
+            <a:ext cx="1786828" cy="1463583"/>
           </a:xfrm>
           <a:prstGeom prst="rect">
             <a:avLst/>
@@ -3855,8 +3693,8 @@
         </p:nvSpPr>
         <p:spPr>
           <a:xfrm>
-            <a:off x="10253502" y="11344931"/>
-            <a:ext cx="1244314" cy="261610"/>
+            <a:off x="15518122" y="12279353"/>
+            <a:ext cx="2385375" cy="400110"/>
           </a:xfrm>
           <a:prstGeom prst="rect">
             <a:avLst/>
@@ -3869,8 +3707,9 @@
           </a:bodyPr>
           <a:lstStyle/>
           <a:p>
-            <a:r>
-              <a:rPr lang="pt-BR" sz="1100" dirty="0"/>
+            <a:pPr algn="just"/>
+            <a:r>
+              <a:rPr lang="pt-BR" sz="2000" dirty="0"/>
               <a:t>Troca de Dados</a:t>
             </a:r>
           </a:p>
@@ -3890,8 +3729,8 @@
         </p:nvSpPr>
         <p:spPr>
           <a:xfrm>
-            <a:off x="3082467" y="9172305"/>
-            <a:ext cx="3218630" cy="584775"/>
+            <a:off x="6325771" y="9991214"/>
+            <a:ext cx="4375182" cy="830997"/>
           </a:xfrm>
           <a:prstGeom prst="rect">
             <a:avLst/>
@@ -3904,8 +3743,9 @@
           </a:bodyPr>
           <a:lstStyle/>
           <a:p>
-            <a:r>
-              <a:rPr lang="pt-BR" sz="1600" dirty="0"/>
+            <a:pPr algn="just"/>
+            <a:r>
+              <a:rPr lang="pt-BR" sz="2400" dirty="0"/>
               <a:t>Os dados coletados são enviado para a nuvem e suas ferramentas</a:t>
             </a:r>
           </a:p>
@@ -3925,8 +3765,8 @@
         </p:nvSpPr>
         <p:spPr>
           <a:xfrm>
-            <a:off x="7557908" y="6529893"/>
-            <a:ext cx="3154624" cy="584775"/>
+            <a:off x="14602519" y="5971809"/>
+            <a:ext cx="5530323" cy="830997"/>
           </a:xfrm>
           <a:prstGeom prst="rect">
             <a:avLst/>
@@ -3952,11 +3792,11 @@
           </a:bodyPr>
           <a:lstStyle/>
           <a:p>
-            <a:r>
-              <a:rPr lang="pt-BR" sz="1600" dirty="0"/>
+            <a:pPr algn="just"/>
+            <a:r>
+              <a:rPr lang="pt-BR" sz="2400" dirty="0"/>
               <a:t>Linguagens usadas para criação da aplicação Web responsiva</a:t>
             </a:r>
-            <a:endParaRPr lang="pt-BR" sz="1600" dirty="0"/>
           </a:p>
         </p:txBody>
       </p:sp>
@@ -3969,11 +3809,11 @@
           <p:nvPr/>
         </p:nvPicPr>
         <p:blipFill>
-          <a:blip r:embed="rId4">
+          <a:blip r:embed="rId2">
             <a:extLst>
               <a:ext uri="{BEBA8EAE-BF5A-486C-A8C5-ECC9F3942E4B}">
                 <a14:imgProps xmlns:a14="http://schemas.microsoft.com/office/drawing/2010/main">
-                  <a14:imgLayer r:embed="rId5">
+                  <a14:imgLayer r:embed="rId3">
                     <a14:imgEffect>
                       <a14:backgroundRemoval t="536" b="100000" l="0" r="99667">
                         <a14:foregroundMark x1="7667" y1="11429" x2="8778" y2="25000"/>
@@ -4001,8 +3841,8 @@
         </p:blipFill>
         <p:spPr>
           <a:xfrm>
-            <a:off x="5047491" y="11099588"/>
-            <a:ext cx="1057730" cy="658143"/>
+            <a:off x="8473763" y="11922680"/>
+            <a:ext cx="1652525" cy="1028237"/>
           </a:xfrm>
           <a:prstGeom prst="rect">
             <a:avLst/>
@@ -4023,8 +3863,8 @@
         </p:nvSpPr>
         <p:spPr>
           <a:xfrm>
-            <a:off x="4774717" y="11940794"/>
-            <a:ext cx="1526380" cy="461665"/>
+            <a:off x="8500144" y="13067864"/>
+            <a:ext cx="1634796" cy="461665"/>
           </a:xfrm>
           <a:prstGeom prst="rect">
             <a:avLst/>
@@ -4032,12 +3872,12 @@
           <a:noFill/>
         </p:spPr>
         <p:txBody>
-          <a:bodyPr wrap="none" lIns="91440" tIns="45720" rIns="91440" bIns="45720">
+          <a:bodyPr wrap="square" lIns="91440" tIns="45720" rIns="91440" bIns="45720">
             <a:spAutoFit/>
           </a:bodyPr>
           <a:lstStyle/>
           <a:p>
-            <a:pPr algn="ctr"/>
+            <a:pPr algn="just"/>
             <a:r>
               <a:rPr lang="pt-BR" sz="2400" dirty="0">
                 <a:ln w="0"/>
@@ -4054,64 +3894,9 @@
               </a:rPr>
               <a:t>JS/Node JS</a:t>
             </a:r>
-            <a:endParaRPr lang="pt-BR" sz="2400" dirty="0">
-              <a:ln w="0"/>
-              <a:solidFill>
-                <a:schemeClr val="accent1"/>
-              </a:solidFill>
-              <a:effectLst>
-                <a:outerShdw blurRad="38100" dist="25400" dir="5400000" algn="ctr" rotWithShape="0">
-                  <a:srgbClr val="6E747A">
-                    <a:alpha val="43000"/>
-                  </a:srgbClr>
-                </a:outerShdw>
-              </a:effectLst>
-            </a:endParaRPr>
-          </a:p>
-        </p:txBody>
-      </p:sp>
-      <p:cxnSp>
-        <p:nvCxnSpPr>
-          <p:cNvPr id="33" name="Conector de Seta Reta 32">
-            <a:extLst>
-              <a:ext uri="{FF2B5EF4-FFF2-40B4-BE49-F238E27FC236}">
-                <a16:creationId xmlns:a16="http://schemas.microsoft.com/office/drawing/2014/main" id="{F9311CF2-1330-48A9-9EB1-D1672C80B244}"/>
-              </a:ext>
-            </a:extLst>
-          </p:cNvPr>
-          <p:cNvCxnSpPr>
-            <a:cxnSpLocks/>
-          </p:cNvCxnSpPr>
-          <p:nvPr/>
-        </p:nvCxnSpPr>
-        <p:spPr>
-          <a:xfrm flipH="1" flipV="1">
-            <a:off x="3880964" y="11373582"/>
-            <a:ext cx="1070600" cy="2"/>
-          </a:xfrm>
-          <a:prstGeom prst="straightConnector1">
-            <a:avLst/>
-          </a:prstGeom>
-          <a:ln>
-            <a:headEnd type="triangle"/>
-            <a:tailEnd type="triangle"/>
-          </a:ln>
-        </p:spPr>
-        <p:style>
-          <a:lnRef idx="3">
-            <a:schemeClr val="dk1"/>
-          </a:lnRef>
-          <a:fillRef idx="0">
-            <a:schemeClr val="dk1"/>
-          </a:fillRef>
-          <a:effectRef idx="2">
-            <a:schemeClr val="dk1"/>
-          </a:effectRef>
-          <a:fontRef idx="minor">
-            <a:schemeClr val="tx1"/>
-          </a:fontRef>
-        </p:style>
-      </p:cxnSp>
+          </a:p>
+        </p:txBody>
+      </p:sp>
       <p:sp>
         <p:nvSpPr>
           <p:cNvPr id="37" name="Retângulo 36">
@@ -4126,8 +3911,8 @@
         </p:nvSpPr>
         <p:spPr>
           <a:xfrm>
-            <a:off x="5004095" y="10574704"/>
-            <a:ext cx="1126683" cy="584775"/>
+            <a:off x="8544496" y="11533280"/>
+            <a:ext cx="1724989" cy="400110"/>
           </a:xfrm>
           <a:prstGeom prst="rect">
             <a:avLst/>
@@ -4140,9 +3925,9 @@
           </a:bodyPr>
           <a:lstStyle/>
           <a:p>
-            <a:pPr algn="ctr"/>
-            <a:r>
-              <a:rPr lang="pt-BR" sz="1600" dirty="0">
+            <a:pPr algn="just"/>
+            <a:r>
+              <a:rPr lang="pt-BR" sz="2000" dirty="0">
                 <a:ln w="0"/>
                 <a:solidFill>
                   <a:schemeClr val="accent1"/>
@@ -4157,19 +3942,6 @@
               </a:rPr>
               <a:t>Servidor Local</a:t>
             </a:r>
-            <a:endParaRPr lang="pt-BR" sz="1600" dirty="0">
-              <a:ln w="0"/>
-              <a:solidFill>
-                <a:schemeClr val="accent1"/>
-              </a:solidFill>
-              <a:effectLst>
-                <a:outerShdw blurRad="38100" dist="25400" dir="5400000" algn="ctr" rotWithShape="0">
-                  <a:srgbClr val="6E747A">
-                    <a:alpha val="43000"/>
-                  </a:srgbClr>
-                </a:outerShdw>
-              </a:effectLst>
-            </a:endParaRPr>
           </a:p>
         </p:txBody>
       </p:sp>
@@ -4181,8 +3953,8 @@
         </p:nvSpPr>
         <p:spPr>
           <a:xfrm>
-            <a:off x="2136710" y="10052008"/>
-            <a:ext cx="11918704" cy="2276717"/>
+            <a:off x="3850106" y="10948525"/>
+            <a:ext cx="16282736" cy="2948156"/>
           </a:xfrm>
           <a:prstGeom prst="rect">
             <a:avLst/>
@@ -4221,7 +3993,7 @@
           </a:bodyPr>
           <a:lstStyle/>
           <a:p>
-            <a:pPr algn="ctr"/>
+            <a:pPr algn="just"/>
             <a:endParaRPr lang="pt-BR"/>
           </a:p>
         </p:txBody>
@@ -4234,8 +4006,8 @@
         </p:nvSpPr>
         <p:spPr>
           <a:xfrm>
-            <a:off x="6981248" y="9568550"/>
-            <a:ext cx="2374015" cy="440472"/>
+            <a:off x="11705234" y="10465067"/>
+            <a:ext cx="2542636" cy="570374"/>
           </a:xfrm>
           <a:prstGeom prst="rect">
             <a:avLst/>
@@ -4268,7 +4040,7 @@
           </a:bodyPr>
           <a:lstStyle/>
           <a:p>
-            <a:pPr algn="ctr"/>
+            <a:pPr algn="just"/>
             <a:endParaRPr lang="pt-BR"/>
           </a:p>
         </p:txBody>
@@ -4281,8 +4053,8 @@
         </p:nvSpPr>
         <p:spPr>
           <a:xfrm>
-            <a:off x="6301097" y="9479589"/>
-            <a:ext cx="2362200" cy="1027307"/>
+            <a:off x="11025921" y="10376106"/>
+            <a:ext cx="2529982" cy="1330276"/>
           </a:xfrm>
           <a:prstGeom prst="rect">
             <a:avLst/>
@@ -4327,8 +4099,8 @@
         </p:nvSpPr>
         <p:spPr>
           <a:xfrm>
-            <a:off x="3001738" y="9046404"/>
-            <a:ext cx="2959284" cy="772781"/>
+            <a:off x="6182755" y="9942921"/>
+            <a:ext cx="4670873" cy="879290"/>
           </a:xfrm>
           <a:prstGeom prst="rect">
             <a:avLst/>
@@ -4367,7 +4139,7 @@
           </a:bodyPr>
           <a:lstStyle/>
           <a:p>
-            <a:pPr algn="ctr"/>
+            <a:pPr algn="just"/>
             <a:endParaRPr lang="pt-BR"/>
           </a:p>
         </p:txBody>
@@ -4381,7 +4153,7 @@
           <p:nvPr/>
         </p:nvPicPr>
         <p:blipFill>
-          <a:blip r:embed="rId17" cstate="hqprint">
+          <a:blip r:embed="rId15" cstate="hqprint">
             <a:extLst>
               <a:ext uri="{28A0092B-C50C-407E-A947-70E740481C1C}">
                 <a14:useLocalDpi xmlns:a14="http://schemas.microsoft.com/office/drawing/2010/main" val="0"/>
@@ -4394,8 +4166,8 @@
         </p:blipFill>
         <p:spPr>
           <a:xfrm>
-            <a:off x="12546148" y="6461422"/>
-            <a:ext cx="960336" cy="200265"/>
+            <a:off x="21443653" y="5794087"/>
+            <a:ext cx="1016429" cy="211962"/>
           </a:xfrm>
           <a:prstGeom prst="rect">
             <a:avLst/>
@@ -4411,7 +4183,7 @@
           <p:nvPr/>
         </p:nvPicPr>
         <p:blipFill>
-          <a:blip r:embed="rId17" cstate="hqprint">
+          <a:blip r:embed="rId15" cstate="hqprint">
             <a:extLst>
               <a:ext uri="{28A0092B-C50C-407E-A947-70E740481C1C}">
                 <a14:useLocalDpi xmlns:a14="http://schemas.microsoft.com/office/drawing/2010/main" val="0"/>
@@ -4424,8 +4196,8 @@
         </p:blipFill>
         <p:spPr>
           <a:xfrm>
-            <a:off x="11653761" y="7005115"/>
-            <a:ext cx="840762" cy="175329"/>
+            <a:off x="20522383" y="6358597"/>
+            <a:ext cx="889870" cy="185570"/>
           </a:xfrm>
           <a:prstGeom prst="rect">
             <a:avLst/>
@@ -4441,7 +4213,7 @@
           <p:nvPr/>
         </p:nvPicPr>
         <p:blipFill>
-          <a:blip r:embed="rId17" cstate="hqprint">
+          <a:blip r:embed="rId15" cstate="hqprint">
             <a:extLst>
               <a:ext uri="{28A0092B-C50C-407E-A947-70E740481C1C}">
                 <a14:useLocalDpi xmlns:a14="http://schemas.microsoft.com/office/drawing/2010/main" val="0"/>
@@ -4454,8 +4226,8 @@
         </p:blipFill>
         <p:spPr>
           <a:xfrm>
-            <a:off x="13683034" y="7180444"/>
-            <a:ext cx="576784" cy="120280"/>
+            <a:off x="22592916" y="6513109"/>
+            <a:ext cx="610476" cy="127306"/>
           </a:xfrm>
           <a:prstGeom prst="rect">
             <a:avLst/>
@@ -4471,7 +4243,7 @@
           <p:nvPr/>
         </p:nvPicPr>
         <p:blipFill>
-          <a:blip r:embed="rId18">
+          <a:blip r:embed="rId16">
             <a:extLst>
               <a:ext uri="{28A0092B-C50C-407E-A947-70E740481C1C}">
                 <a14:useLocalDpi xmlns:a14="http://schemas.microsoft.com/office/drawing/2010/main" val="0"/>
@@ -4484,8 +4256,8 @@
         </p:blipFill>
         <p:spPr>
           <a:xfrm>
-            <a:off x="12709537" y="7248980"/>
-            <a:ext cx="150298" cy="150298"/>
+            <a:off x="21599363" y="6640415"/>
+            <a:ext cx="159077" cy="159077"/>
           </a:xfrm>
           <a:prstGeom prst="rect">
             <a:avLst/>
@@ -4501,7 +4273,7 @@
           <p:nvPr/>
         </p:nvPicPr>
         <p:blipFill>
-          <a:blip r:embed="rId18">
+          <a:blip r:embed="rId16">
             <a:extLst>
               <a:ext uri="{28A0092B-C50C-407E-A947-70E740481C1C}">
                 <a14:useLocalDpi xmlns:a14="http://schemas.microsoft.com/office/drawing/2010/main" val="0"/>
@@ -4514,84 +4286,29 @@
         </p:blipFill>
         <p:spPr>
           <a:xfrm>
-            <a:off x="13372444" y="7047128"/>
-            <a:ext cx="226706" cy="226706"/>
+            <a:off x="22327824" y="6367675"/>
+            <a:ext cx="239949" cy="239949"/>
           </a:xfrm>
           <a:prstGeom prst="rect">
             <a:avLst/>
           </a:prstGeom>
         </p:spPr>
       </p:pic>
-      <p:pic>
-        <p:nvPicPr>
-          <p:cNvPr id="71" name="Picture 2" descr="Resultado de imagem para arduino uno com DHT11">
-            <a:extLst>
-              <a:ext uri="{FF2B5EF4-FFF2-40B4-BE49-F238E27FC236}">
-                <a16:creationId xmlns:a16="http://schemas.microsoft.com/office/drawing/2014/main" id="{D812938F-9E87-4536-81A3-11929954AE4C}"/>
-              </a:ext>
-            </a:extLst>
-          </p:cNvPr>
-          <p:cNvPicPr>
-            <a:picLocks noChangeAspect="1" noChangeArrowheads="1"/>
-          </p:cNvPicPr>
-          <p:nvPr/>
-        </p:nvPicPr>
-        <p:blipFill>
-          <a:blip r:embed="rId6">
-            <a:extLst>
-              <a:ext uri="{28A0092B-C50C-407E-A947-70E740481C1C}">
-                <a14:useLocalDpi xmlns:a14="http://schemas.microsoft.com/office/drawing/2010/main" val="0"/>
-              </a:ext>
-            </a:extLst>
-          </a:blip>
-          <a:srcRect/>
-          <a:stretch>
-            <a:fillRect/>
-          </a:stretch>
-        </p:blipFill>
-        <p:spPr bwMode="auto">
-          <a:xfrm>
-            <a:off x="12807205" y="2307515"/>
-            <a:ext cx="2405384" cy="1239981"/>
-          </a:xfrm>
-          <a:prstGeom prst="rect">
-            <a:avLst/>
-          </a:prstGeom>
-          <a:ln>
-            <a:noFill/>
-          </a:ln>
-          <a:effectLst>
-            <a:outerShdw blurRad="292100" dist="139700" dir="2700000" algn="tl" rotWithShape="0">
-              <a:srgbClr val="333333">
-                <a:alpha val="65000"/>
-              </a:srgbClr>
-            </a:outerShdw>
-          </a:effectLst>
-          <a:extLst/>
-        </p:spPr>
-      </p:pic>
       <p:cxnSp>
         <p:nvCxnSpPr>
-          <p:cNvPr id="72" name="Conector de Seta Reta 71">
-            <a:extLst>
-              <a:ext uri="{FF2B5EF4-FFF2-40B4-BE49-F238E27FC236}">
-                <a16:creationId xmlns:a16="http://schemas.microsoft.com/office/drawing/2014/main" id="{026327FF-F533-4EE7-A29C-8AAE39A505EA}"/>
-              </a:ext>
-            </a:extLst>
-          </p:cNvPr>
+          <p:cNvPr id="97" name="Conector de Seta Reta 96"/>
           <p:cNvCxnSpPr/>
           <p:nvPr/>
         </p:nvCxnSpPr>
         <p:spPr>
-          <a:xfrm>
-            <a:off x="15292826" y="2845374"/>
-            <a:ext cx="1765167" cy="0"/>
+          <a:xfrm flipH="1">
+            <a:off x="4232488" y="6837453"/>
+            <a:ext cx="1058374" cy="0"/>
           </a:xfrm>
           <a:prstGeom prst="straightConnector1">
             <a:avLst/>
           </a:prstGeom>
-          <a:ln>
-            <a:headEnd type="triangle"/>
+          <a:ln w="76200">
             <a:tailEnd type="triangle"/>
           </a:ln>
         </p:spPr>
@@ -4603,831 +4320,6 @@
             <a:schemeClr val="dk1"/>
           </a:fillRef>
           <a:effectRef idx="2">
-            <a:schemeClr val="dk1"/>
-          </a:effectRef>
-          <a:fontRef idx="minor">
-            <a:schemeClr val="tx1"/>
-          </a:fontRef>
-        </p:style>
-      </p:cxnSp>
-      <p:sp>
-        <p:nvSpPr>
-          <p:cNvPr id="73" name="Retângulo 72">
-            <a:extLst>
-              <a:ext uri="{FF2B5EF4-FFF2-40B4-BE49-F238E27FC236}">
-                <a16:creationId xmlns:a16="http://schemas.microsoft.com/office/drawing/2014/main" id="{8015C4A5-A75D-4892-B1AE-ED515FF5CD8C}"/>
-              </a:ext>
-            </a:extLst>
-          </p:cNvPr>
-          <p:cNvSpPr/>
-          <p:nvPr/>
-        </p:nvSpPr>
-        <p:spPr>
-          <a:xfrm>
-            <a:off x="7552517" y="3491900"/>
-            <a:ext cx="1999395" cy="461665"/>
-          </a:xfrm>
-          <a:prstGeom prst="rect">
-            <a:avLst/>
-          </a:prstGeom>
-          <a:noFill/>
-        </p:spPr>
-        <p:txBody>
-          <a:bodyPr wrap="none" lIns="91440" tIns="45720" rIns="91440" bIns="45720">
-            <a:spAutoFit/>
-          </a:bodyPr>
-          <a:lstStyle/>
-          <a:p>
-            <a:pPr algn="ctr"/>
-            <a:r>
-              <a:rPr lang="pt-BR" sz="2400" dirty="0" err="1">
-                <a:ln w="0"/>
-                <a:solidFill>
-                  <a:schemeClr val="accent1"/>
-                </a:solidFill>
-                <a:effectLst>
-                  <a:outerShdw blurRad="38100" dist="25400" dir="5400000" algn="ctr" rotWithShape="0">
-                    <a:srgbClr val="6E747A">
-                      <a:alpha val="43000"/>
-                    </a:srgbClr>
-                  </a:outerShdw>
-                </a:effectLst>
-              </a:rPr>
-              <a:t>Wifi</a:t>
-            </a:r>
-            <a:r>
-              <a:rPr lang="pt-BR" sz="2400" dirty="0">
-                <a:ln w="0"/>
-                <a:solidFill>
-                  <a:schemeClr val="accent1"/>
-                </a:solidFill>
-                <a:effectLst>
-                  <a:outerShdw blurRad="38100" dist="25400" dir="5400000" algn="ctr" rotWithShape="0">
-                    <a:srgbClr val="6E747A">
-                      <a:alpha val="43000"/>
-                    </a:srgbClr>
-                  </a:outerShdw>
-                </a:effectLst>
-              </a:rPr>
-              <a:t> + Internet</a:t>
-            </a:r>
-          </a:p>
-        </p:txBody>
-      </p:sp>
-      <p:cxnSp>
-        <p:nvCxnSpPr>
-          <p:cNvPr id="74" name="Conector de Seta Reta 73">
-            <a:extLst>
-              <a:ext uri="{FF2B5EF4-FFF2-40B4-BE49-F238E27FC236}">
-                <a16:creationId xmlns:a16="http://schemas.microsoft.com/office/drawing/2014/main" id="{F9311CF2-1330-48A9-9EB1-D1672C80B244}"/>
-              </a:ext>
-            </a:extLst>
-          </p:cNvPr>
-          <p:cNvCxnSpPr>
-            <a:cxnSpLocks/>
-          </p:cNvCxnSpPr>
-          <p:nvPr/>
-        </p:nvCxnSpPr>
-        <p:spPr>
-          <a:xfrm flipH="1">
-            <a:off x="11603452" y="2981349"/>
-            <a:ext cx="1106085" cy="5818"/>
-          </a:xfrm>
-          <a:prstGeom prst="straightConnector1">
-            <a:avLst/>
-          </a:prstGeom>
-          <a:ln>
-            <a:headEnd type="triangle"/>
-            <a:tailEnd type="triangle"/>
-          </a:ln>
-        </p:spPr>
-        <p:style>
-          <a:lnRef idx="3">
-            <a:schemeClr val="dk1"/>
-          </a:lnRef>
-          <a:fillRef idx="0">
-            <a:schemeClr val="dk1"/>
-          </a:fillRef>
-          <a:effectRef idx="2">
-            <a:schemeClr val="dk1"/>
-          </a:effectRef>
-          <a:fontRef idx="minor">
-            <a:schemeClr val="tx1"/>
-          </a:fontRef>
-        </p:style>
-      </p:cxnSp>
-      <p:sp>
-        <p:nvSpPr>
-          <p:cNvPr id="75" name="Retângulo 74">
-            <a:extLst>
-              <a:ext uri="{FF2B5EF4-FFF2-40B4-BE49-F238E27FC236}">
-                <a16:creationId xmlns:a16="http://schemas.microsoft.com/office/drawing/2014/main" id="{743871E3-138B-4807-A8B6-2963B367FEB4}"/>
-              </a:ext>
-            </a:extLst>
-          </p:cNvPr>
-          <p:cNvSpPr/>
-          <p:nvPr/>
-        </p:nvSpPr>
-        <p:spPr>
-          <a:xfrm>
-            <a:off x="16852556" y="2570583"/>
-            <a:ext cx="2683747" cy="1384995"/>
-          </a:xfrm>
-          <a:prstGeom prst="rect">
-            <a:avLst/>
-          </a:prstGeom>
-          <a:noFill/>
-        </p:spPr>
-        <p:txBody>
-          <a:bodyPr wrap="none" lIns="91440" tIns="45720" rIns="91440" bIns="45720">
-            <a:spAutoFit/>
-          </a:bodyPr>
-          <a:lstStyle/>
-          <a:p>
-            <a:pPr algn="ctr"/>
-            <a:r>
-              <a:rPr lang="pt-BR" sz="2800" dirty="0">
-                <a:ln w="0"/>
-                <a:solidFill>
-                  <a:schemeClr val="accent1"/>
-                </a:solidFill>
-                <a:effectLst>
-                  <a:outerShdw blurRad="38100" dist="25400" dir="5400000" algn="ctr" rotWithShape="0">
-                    <a:srgbClr val="6E747A">
-                      <a:alpha val="43000"/>
-                    </a:srgbClr>
-                  </a:outerShdw>
-                </a:effectLst>
-              </a:rPr>
-              <a:t>Umidificador </a:t>
-            </a:r>
-          </a:p>
-          <a:p>
-            <a:pPr algn="ctr"/>
-            <a:r>
-              <a:rPr lang="pt-BR" sz="2800" dirty="0">
-                <a:ln w="0"/>
-                <a:solidFill>
-                  <a:schemeClr val="accent1"/>
-                </a:solidFill>
-                <a:effectLst>
-                  <a:outerShdw blurRad="38100" dist="25400" dir="5400000" algn="ctr" rotWithShape="0">
-                    <a:srgbClr val="6E747A">
-                      <a:alpha val="43000"/>
-                    </a:srgbClr>
-                  </a:outerShdw>
-                </a:effectLst>
-              </a:rPr>
-              <a:t>+</a:t>
-            </a:r>
-          </a:p>
-          <a:p>
-            <a:pPr algn="ctr"/>
-            <a:r>
-              <a:rPr lang="pt-BR" sz="2800" dirty="0">
-                <a:ln w="0"/>
-                <a:solidFill>
-                  <a:schemeClr val="accent1"/>
-                </a:solidFill>
-                <a:effectLst>
-                  <a:outerShdw blurRad="38100" dist="25400" dir="5400000" algn="ctr" rotWithShape="0">
-                    <a:srgbClr val="6E747A">
-                      <a:alpha val="43000"/>
-                    </a:srgbClr>
-                  </a:outerShdw>
-                </a:effectLst>
-              </a:rPr>
-              <a:t> Ar Condicionado</a:t>
-            </a:r>
-          </a:p>
-        </p:txBody>
-      </p:sp>
-      <p:sp>
-        <p:nvSpPr>
-          <p:cNvPr id="76" name="Retângulo 75">
-            <a:extLst>
-              <a:ext uri="{FF2B5EF4-FFF2-40B4-BE49-F238E27FC236}">
-                <a16:creationId xmlns:a16="http://schemas.microsoft.com/office/drawing/2014/main" id="{F7B5A5FA-7683-40EE-BFF0-4530A2BC8586}"/>
-              </a:ext>
-            </a:extLst>
-          </p:cNvPr>
-          <p:cNvSpPr/>
-          <p:nvPr/>
-        </p:nvSpPr>
-        <p:spPr>
-          <a:xfrm>
-            <a:off x="12438592" y="3520499"/>
-            <a:ext cx="3234155" cy="461665"/>
-          </a:xfrm>
-          <a:prstGeom prst="rect">
-            <a:avLst/>
-          </a:prstGeom>
-          <a:noFill/>
-        </p:spPr>
-        <p:txBody>
-          <a:bodyPr wrap="none" lIns="91440" tIns="45720" rIns="91440" bIns="45720">
-            <a:spAutoFit/>
-          </a:bodyPr>
-          <a:lstStyle/>
-          <a:p>
-            <a:pPr algn="ctr"/>
-            <a:r>
-              <a:rPr lang="pt-BR" sz="2400" dirty="0">
-                <a:ln w="0"/>
-                <a:solidFill>
-                  <a:schemeClr val="accent1"/>
-                </a:solidFill>
-                <a:effectLst>
-                  <a:outerShdw blurRad="38100" dist="25400" dir="5400000" algn="ctr" rotWithShape="0">
-                    <a:srgbClr val="6E747A">
-                      <a:alpha val="43000"/>
-                    </a:srgbClr>
-                  </a:outerShdw>
-                </a:effectLst>
-              </a:rPr>
-              <a:t>Arduino + Sensor DHT11</a:t>
-            </a:r>
-          </a:p>
-        </p:txBody>
-      </p:sp>
-      <p:pic>
-        <p:nvPicPr>
-          <p:cNvPr id="77" name="Picture 2" descr="Resultado de imagem para modem de internet">
-            <a:extLst>
-              <a:ext uri="{FF2B5EF4-FFF2-40B4-BE49-F238E27FC236}">
-                <a16:creationId xmlns:a16="http://schemas.microsoft.com/office/drawing/2014/main" id="{82623677-CCEB-47C6-8FBB-045CD7C110BE}"/>
-              </a:ext>
-            </a:extLst>
-          </p:cNvPr>
-          <p:cNvPicPr>
-            <a:picLocks noChangeAspect="1" noChangeArrowheads="1"/>
-          </p:cNvPicPr>
-          <p:nvPr/>
-        </p:nvPicPr>
-        <p:blipFill>
-          <a:blip r:embed="rId11" cstate="hqprint">
-            <a:extLst>
-              <a:ext uri="{BEBA8EAE-BF5A-486C-A8C5-ECC9F3942E4B}">
-                <a14:imgProps xmlns:a14="http://schemas.microsoft.com/office/drawing/2010/main">
-                  <a14:imgLayer r:embed="rId12">
-                    <a14:imgEffect>
-                      <a14:backgroundRemoval t="10000" b="90000" l="400" r="100000">
-                        <a14:foregroundMark x1="13000" y1="55000" x2="12200" y2="64800"/>
-                        <a14:foregroundMark x1="87600" y1="53200" x2="93600" y2="70200"/>
-                      </a14:backgroundRemoval>
-                    </a14:imgEffect>
-                  </a14:imgLayer>
-                </a14:imgProps>
-              </a:ext>
-              <a:ext uri="{28A0092B-C50C-407E-A947-70E740481C1C}">
-                <a14:useLocalDpi xmlns:a14="http://schemas.microsoft.com/office/drawing/2010/main" val="0"/>
-              </a:ext>
-            </a:extLst>
-          </a:blip>
-          <a:srcRect/>
-          <a:stretch>
-            <a:fillRect/>
-          </a:stretch>
-        </p:blipFill>
-        <p:spPr bwMode="auto">
-          <a:xfrm>
-            <a:off x="8003978" y="2186792"/>
-            <a:ext cx="1124861" cy="1124861"/>
-          </a:xfrm>
-          <a:prstGeom prst="rect">
-            <a:avLst/>
-          </a:prstGeom>
-          <a:noFill/>
-          <a:extLst>
-            <a:ext uri="{909E8E84-426E-40DD-AFC4-6F175D3DCCD1}">
-              <a14:hiddenFill xmlns:a14="http://schemas.microsoft.com/office/drawing/2010/main">
-                <a:solidFill>
-                  <a:srgbClr val="FFFFFF"/>
-                </a:solidFill>
-              </a14:hiddenFill>
-            </a:ext>
-          </a:extLst>
-        </p:spPr>
-      </p:pic>
-      <p:sp>
-        <p:nvSpPr>
-          <p:cNvPr id="78" name="CaixaDeTexto 77">
-            <a:extLst>
-              <a:ext uri="{FF2B5EF4-FFF2-40B4-BE49-F238E27FC236}">
-                <a16:creationId xmlns:a16="http://schemas.microsoft.com/office/drawing/2014/main" id="{34EE0974-53E6-4AED-897C-A38F7FD33207}"/>
-              </a:ext>
-            </a:extLst>
-          </p:cNvPr>
-          <p:cNvSpPr txBox="1"/>
-          <p:nvPr/>
-        </p:nvSpPr>
-        <p:spPr>
-          <a:xfrm>
-            <a:off x="15710846" y="2898853"/>
-            <a:ext cx="1244314" cy="261610"/>
-          </a:xfrm>
-          <a:prstGeom prst="rect">
-            <a:avLst/>
-          </a:prstGeom>
-          <a:noFill/>
-        </p:spPr>
-        <p:txBody>
-          <a:bodyPr wrap="square" rtlCol="0">
-            <a:spAutoFit/>
-          </a:bodyPr>
-          <a:lstStyle/>
-          <a:p>
-            <a:r>
-              <a:rPr lang="pt-BR" sz="1100" dirty="0"/>
-              <a:t>Troca de Dados</a:t>
-            </a:r>
-          </a:p>
-        </p:txBody>
-      </p:sp>
-      <p:pic>
-        <p:nvPicPr>
-          <p:cNvPr id="80" name="Imagem 79"/>
-          <p:cNvPicPr>
-            <a:picLocks noChangeAspect="1"/>
-          </p:cNvPicPr>
-          <p:nvPr/>
-        </p:nvPicPr>
-        <p:blipFill>
-          <a:blip r:embed="rId4">
-            <a:extLst>
-              <a:ext uri="{BEBA8EAE-BF5A-486C-A8C5-ECC9F3942E4B}">
-                <a14:imgProps xmlns:a14="http://schemas.microsoft.com/office/drawing/2010/main">
-                  <a14:imgLayer r:embed="rId5">
-                    <a14:imgEffect>
-                      <a14:backgroundRemoval t="536" b="100000" l="0" r="99667">
-                        <a14:foregroundMark x1="7667" y1="11429" x2="8778" y2="25000"/>
-                        <a14:foregroundMark x1="10000" y1="2143" x2="89000" y2="1607"/>
-                        <a14:foregroundMark x1="89889" y1="2143" x2="89000" y2="14107"/>
-                        <a14:foregroundMark x1="50333" y1="76607" x2="49556" y2="78036"/>
-                        <a14:foregroundMark x1="3667" y1="93393" x2="18889" y2="95893"/>
-                        <a14:foregroundMark x1="18111" y1="95536" x2="96667" y2="96429"/>
-                        <a14:foregroundMark x1="49889" y1="91964" x2="54333" y2="71607"/>
-                        <a14:foregroundMark x1="20222" y1="93571" x2="95333" y2="92857"/>
-                        <a14:foregroundMark x1="10000" y1="97321" x2="3222" y2="96607"/>
-                        <a14:foregroundMark x1="60556" y1="77679" x2="89889" y2="73393"/>
-                        <a14:foregroundMark x1="89889" y1="73571" x2="89889" y2="73571"/>
-                        <a14:foregroundMark x1="35333" y1="79286" x2="8667" y2="55536"/>
-                      </a14:backgroundRemoval>
-                    </a14:imgEffect>
-                  </a14:imgLayer>
-                </a14:imgProps>
-              </a:ext>
-            </a:extLst>
-          </a:blip>
-          <a:stretch>
-            <a:fillRect/>
-          </a:stretch>
-        </p:blipFill>
-        <p:spPr>
-          <a:xfrm>
-            <a:off x="10504486" y="2682244"/>
-            <a:ext cx="1057730" cy="658143"/>
-          </a:xfrm>
-          <a:prstGeom prst="rect">
-            <a:avLst/>
-          </a:prstGeom>
-        </p:spPr>
-      </p:pic>
-      <p:sp>
-        <p:nvSpPr>
-          <p:cNvPr id="81" name="Retângulo 80">
-            <a:extLst>
-              <a:ext uri="{FF2B5EF4-FFF2-40B4-BE49-F238E27FC236}">
-                <a16:creationId xmlns:a16="http://schemas.microsoft.com/office/drawing/2014/main" id="{8015C4A5-A75D-4892-B1AE-ED515FF5CD8C}"/>
-              </a:ext>
-            </a:extLst>
-          </p:cNvPr>
-          <p:cNvSpPr/>
-          <p:nvPr/>
-        </p:nvSpPr>
-        <p:spPr>
-          <a:xfrm>
-            <a:off x="10232061" y="3494716"/>
-            <a:ext cx="1526380" cy="461665"/>
-          </a:xfrm>
-          <a:prstGeom prst="rect">
-            <a:avLst/>
-          </a:prstGeom>
-          <a:noFill/>
-        </p:spPr>
-        <p:txBody>
-          <a:bodyPr wrap="none" lIns="91440" tIns="45720" rIns="91440" bIns="45720">
-            <a:spAutoFit/>
-          </a:bodyPr>
-          <a:lstStyle/>
-          <a:p>
-            <a:pPr algn="ctr"/>
-            <a:r>
-              <a:rPr lang="pt-BR" sz="2400" dirty="0">
-                <a:ln w="0"/>
-                <a:solidFill>
-                  <a:schemeClr val="accent1"/>
-                </a:solidFill>
-                <a:effectLst>
-                  <a:outerShdw blurRad="38100" dist="25400" dir="5400000" algn="ctr" rotWithShape="0">
-                    <a:srgbClr val="6E747A">
-                      <a:alpha val="43000"/>
-                    </a:srgbClr>
-                  </a:outerShdw>
-                </a:effectLst>
-              </a:rPr>
-              <a:t>JS/Node JS</a:t>
-            </a:r>
-            <a:endParaRPr lang="pt-BR" sz="2400" dirty="0">
-              <a:ln w="0"/>
-              <a:solidFill>
-                <a:schemeClr val="accent1"/>
-              </a:solidFill>
-              <a:effectLst>
-                <a:outerShdw blurRad="38100" dist="25400" dir="5400000" algn="ctr" rotWithShape="0">
-                  <a:srgbClr val="6E747A">
-                    <a:alpha val="43000"/>
-                  </a:srgbClr>
-                </a:outerShdw>
-              </a:effectLst>
-            </a:endParaRPr>
-          </a:p>
-        </p:txBody>
-      </p:sp>
-      <p:cxnSp>
-        <p:nvCxnSpPr>
-          <p:cNvPr id="82" name="Conector de Seta Reta 81">
-            <a:extLst>
-              <a:ext uri="{FF2B5EF4-FFF2-40B4-BE49-F238E27FC236}">
-                <a16:creationId xmlns:a16="http://schemas.microsoft.com/office/drawing/2014/main" id="{F9311CF2-1330-48A9-9EB1-D1672C80B244}"/>
-              </a:ext>
-            </a:extLst>
-          </p:cNvPr>
-          <p:cNvCxnSpPr>
-            <a:cxnSpLocks/>
-          </p:cNvCxnSpPr>
-          <p:nvPr/>
-        </p:nvCxnSpPr>
-        <p:spPr>
-          <a:xfrm flipH="1" flipV="1">
-            <a:off x="9338308" y="2927504"/>
-            <a:ext cx="1070600" cy="2"/>
-          </a:xfrm>
-          <a:prstGeom prst="straightConnector1">
-            <a:avLst/>
-          </a:prstGeom>
-          <a:ln>
-            <a:headEnd type="triangle"/>
-            <a:tailEnd type="triangle"/>
-          </a:ln>
-        </p:spPr>
-        <p:style>
-          <a:lnRef idx="3">
-            <a:schemeClr val="dk1"/>
-          </a:lnRef>
-          <a:fillRef idx="0">
-            <a:schemeClr val="dk1"/>
-          </a:fillRef>
-          <a:effectRef idx="2">
-            <a:schemeClr val="dk1"/>
-          </a:effectRef>
-          <a:fontRef idx="minor">
-            <a:schemeClr val="tx1"/>
-          </a:fontRef>
-        </p:style>
-      </p:cxnSp>
-      <p:sp>
-        <p:nvSpPr>
-          <p:cNvPr id="83" name="Retângulo 82">
-            <a:extLst>
-              <a:ext uri="{FF2B5EF4-FFF2-40B4-BE49-F238E27FC236}">
-                <a16:creationId xmlns:a16="http://schemas.microsoft.com/office/drawing/2014/main" id="{8015C4A5-A75D-4892-B1AE-ED515FF5CD8C}"/>
-              </a:ext>
-            </a:extLst>
-          </p:cNvPr>
-          <p:cNvSpPr/>
-          <p:nvPr/>
-        </p:nvSpPr>
-        <p:spPr>
-          <a:xfrm>
-            <a:off x="10461439" y="2128626"/>
-            <a:ext cx="1126683" cy="584775"/>
-          </a:xfrm>
-          <a:prstGeom prst="rect">
-            <a:avLst/>
-          </a:prstGeom>
-          <a:noFill/>
-        </p:spPr>
-        <p:txBody>
-          <a:bodyPr wrap="square" lIns="91440" tIns="45720" rIns="91440" bIns="45720">
-            <a:spAutoFit/>
-          </a:bodyPr>
-          <a:lstStyle/>
-          <a:p>
-            <a:pPr algn="ctr"/>
-            <a:r>
-              <a:rPr lang="pt-BR" sz="1600" dirty="0">
-                <a:ln w="0"/>
-                <a:solidFill>
-                  <a:schemeClr val="accent1"/>
-                </a:solidFill>
-                <a:effectLst>
-                  <a:outerShdw blurRad="38100" dist="25400" dir="5400000" algn="ctr" rotWithShape="0">
-                    <a:srgbClr val="6E747A">
-                      <a:alpha val="43000"/>
-                    </a:srgbClr>
-                  </a:outerShdw>
-                </a:effectLst>
-              </a:rPr>
-              <a:t>Servidor Local</a:t>
-            </a:r>
-            <a:endParaRPr lang="pt-BR" sz="1600" dirty="0">
-              <a:ln w="0"/>
-              <a:solidFill>
-                <a:schemeClr val="accent1"/>
-              </a:solidFill>
-              <a:effectLst>
-                <a:outerShdw blurRad="38100" dist="25400" dir="5400000" algn="ctr" rotWithShape="0">
-                  <a:srgbClr val="6E747A">
-                    <a:alpha val="43000"/>
-                  </a:srgbClr>
-                </a:outerShdw>
-              </a:effectLst>
-            </a:endParaRPr>
-          </a:p>
-        </p:txBody>
-      </p:sp>
-      <p:sp>
-        <p:nvSpPr>
-          <p:cNvPr id="84" name="Retângulo 83"/>
-          <p:cNvSpPr/>
-          <p:nvPr/>
-        </p:nvSpPr>
-        <p:spPr>
-          <a:xfrm>
-            <a:off x="7547132" y="1586860"/>
-            <a:ext cx="11918704" cy="2276717"/>
-          </a:xfrm>
-          <a:prstGeom prst="rect">
-            <a:avLst/>
-          </a:prstGeom>
-          <a:noFill/>
-          <a:ln w="9525" cap="flat" cmpd="sng" algn="ctr">
-            <a:solidFill>
-              <a:schemeClr val="dk1"/>
-            </a:solidFill>
-            <a:prstDash val="solid"/>
-            <a:round/>
-            <a:headEnd type="none" w="med" len="med"/>
-            <a:tailEnd type="none" w="med" len="med"/>
-          </a:ln>
-        </p:spPr>
-        <p:style>
-          <a:lnRef idx="0">
-            <a:scrgbClr r="0" g="0" b="0"/>
-          </a:lnRef>
-          <a:fillRef idx="0">
-            <a:scrgbClr r="0" g="0" b="0"/>
-          </a:fillRef>
-          <a:effectRef idx="0">
-            <a:scrgbClr r="0" g="0" b="0"/>
-          </a:effectRef>
-          <a:fontRef idx="minor">
-            <a:schemeClr val="dk1"/>
-          </a:fontRef>
-        </p:style>
-        <p:txBody>
-          <a:bodyPr rot="0" spcFirstLastPara="0" vertOverflow="overflow" horzOverflow="overflow" vert="horz" wrap="square" lIns="91440" tIns="45720" rIns="91440" bIns="45720" numCol="1" spcCol="0" rtlCol="0" fromWordArt="0" anchor="ctr" anchorCtr="0" forceAA="0" compatLnSpc="1">
-            <a:prstTxWarp prst="textNoShape">
-              <a:avLst/>
-            </a:prstTxWarp>
-            <a:noAutofit/>
-          </a:bodyPr>
-          <a:lstStyle/>
-          <a:p>
-            <a:pPr algn="ctr"/>
-            <a:endParaRPr lang="pt-BR"/>
-          </a:p>
-        </p:txBody>
-      </p:sp>
-      <p:sp>
-        <p:nvSpPr>
-          <p:cNvPr id="85" name="Retângulo 84"/>
-          <p:cNvSpPr/>
-          <p:nvPr/>
-        </p:nvSpPr>
-        <p:spPr>
-          <a:xfrm>
-            <a:off x="12438592" y="1122472"/>
-            <a:ext cx="2374015" cy="440472"/>
-          </a:xfrm>
-          <a:prstGeom prst="rect">
-            <a:avLst/>
-          </a:prstGeom>
-          <a:noFill/>
-          <a:ln>
-            <a:noFill/>
-          </a:ln>
-        </p:spPr>
-        <p:style>
-          <a:lnRef idx="0">
-            <a:scrgbClr r="0" g="0" b="0"/>
-          </a:lnRef>
-          <a:fillRef idx="0">
-            <a:scrgbClr r="0" g="0" b="0"/>
-          </a:fillRef>
-          <a:effectRef idx="0">
-            <a:scrgbClr r="0" g="0" b="0"/>
-          </a:effectRef>
-          <a:fontRef idx="minor">
-            <a:schemeClr val="dk1"/>
-          </a:fontRef>
-        </p:style>
-        <p:txBody>
-          <a:bodyPr rot="0" spcFirstLastPara="0" vertOverflow="overflow" horzOverflow="overflow" vert="horz" wrap="square" lIns="91440" tIns="45720" rIns="91440" bIns="45720" numCol="1" spcCol="0" rtlCol="0" fromWordArt="0" anchor="ctr" anchorCtr="0" forceAA="0" compatLnSpc="1">
-            <a:prstTxWarp prst="textNoShape">
-              <a:avLst/>
-            </a:prstTxWarp>
-            <a:noAutofit/>
-          </a:bodyPr>
-          <a:lstStyle/>
-          <a:p>
-            <a:pPr algn="ctr"/>
-            <a:endParaRPr lang="pt-BR"/>
-          </a:p>
-        </p:txBody>
-      </p:sp>
-      <p:sp>
-        <p:nvSpPr>
-          <p:cNvPr id="86" name="Retângulo 85"/>
-          <p:cNvSpPr/>
-          <p:nvPr/>
-        </p:nvSpPr>
-        <p:spPr>
-          <a:xfrm>
-            <a:off x="11758441" y="1033511"/>
-            <a:ext cx="2362200" cy="1027307"/>
-          </a:xfrm>
-          <a:prstGeom prst="rect">
-            <a:avLst/>
-          </a:prstGeom>
-        </p:spPr>
-        <p:style>
-          <a:lnRef idx="2">
-            <a:schemeClr val="dk1"/>
-          </a:lnRef>
-          <a:fillRef idx="1">
-            <a:schemeClr val="lt1"/>
-          </a:fillRef>
-          <a:effectRef idx="0">
-            <a:schemeClr val="dk1"/>
-          </a:effectRef>
-          <a:fontRef idx="minor">
-            <a:schemeClr val="dk1"/>
-          </a:fontRef>
-        </p:style>
-        <p:txBody>
-          <a:bodyPr rot="0" spcFirstLastPara="0" vertOverflow="overflow" horzOverflow="overflow" vert="horz" wrap="square" lIns="91440" tIns="45720" rIns="91440" bIns="45720" numCol="1" spcCol="0" rtlCol="0" fromWordArt="0" anchor="ctr" anchorCtr="0" forceAA="0" compatLnSpc="1">
-            <a:prstTxWarp prst="textNoShape">
-              <a:avLst/>
-            </a:prstTxWarp>
-            <a:noAutofit/>
-          </a:bodyPr>
-          <a:lstStyle/>
-          <a:p>
-            <a:pPr algn="ctr"/>
-            <a:r>
-              <a:rPr lang="pt-BR" dirty="0"/>
-              <a:t>Rede local</a:t>
-            </a:r>
-          </a:p>
-        </p:txBody>
-      </p:sp>
-      <p:cxnSp>
-        <p:nvCxnSpPr>
-          <p:cNvPr id="61" name="Conector de Seta Reta 60"/>
-          <p:cNvCxnSpPr/>
-          <p:nvPr/>
-        </p:nvCxnSpPr>
-        <p:spPr>
-          <a:xfrm flipV="1">
-            <a:off x="5004095" y="3953565"/>
-            <a:ext cx="2248098" cy="1380957"/>
-          </a:xfrm>
-          <a:prstGeom prst="straightConnector1">
-            <a:avLst/>
-          </a:prstGeom>
-          <a:ln>
-            <a:tailEnd type="triangle"/>
-          </a:ln>
-        </p:spPr>
-        <p:style>
-          <a:lnRef idx="1">
-            <a:schemeClr val="dk1"/>
-          </a:lnRef>
-          <a:fillRef idx="0">
-            <a:schemeClr val="dk1"/>
-          </a:fillRef>
-          <a:effectRef idx="0">
-            <a:schemeClr val="dk1"/>
-          </a:effectRef>
-          <a:fontRef idx="minor">
-            <a:schemeClr val="tx1"/>
-          </a:fontRef>
-        </p:style>
-      </p:cxnSp>
-      <p:cxnSp>
-        <p:nvCxnSpPr>
-          <p:cNvPr id="97" name="Conector de Seta Reta 96"/>
-          <p:cNvCxnSpPr/>
-          <p:nvPr/>
-        </p:nvCxnSpPr>
-        <p:spPr>
-          <a:xfrm flipH="1" flipV="1">
-            <a:off x="3062860" y="7358993"/>
-            <a:ext cx="188395" cy="197163"/>
-          </a:xfrm>
-          <a:prstGeom prst="straightConnector1">
-            <a:avLst/>
-          </a:prstGeom>
-          <a:ln>
-            <a:tailEnd type="triangle"/>
-          </a:ln>
-        </p:spPr>
-        <p:style>
-          <a:lnRef idx="1">
-            <a:schemeClr val="dk1"/>
-          </a:lnRef>
-          <a:fillRef idx="0">
-            <a:schemeClr val="dk1"/>
-          </a:fillRef>
-          <a:effectRef idx="0">
-            <a:schemeClr val="dk1"/>
-          </a:effectRef>
-          <a:fontRef idx="minor">
-            <a:schemeClr val="tx1"/>
-          </a:fontRef>
-        </p:style>
-      </p:cxnSp>
-      <p:cxnSp>
-        <p:nvCxnSpPr>
-          <p:cNvPr id="102" name="Conector de Seta Reta 101"/>
-          <p:cNvCxnSpPr/>
-          <p:nvPr/>
-        </p:nvCxnSpPr>
-        <p:spPr>
-          <a:xfrm flipV="1">
-            <a:off x="3267659" y="7137320"/>
-            <a:ext cx="403836" cy="1"/>
-          </a:xfrm>
-          <a:prstGeom prst="straightConnector1">
-            <a:avLst/>
-          </a:prstGeom>
-          <a:ln>
-            <a:tailEnd type="triangle"/>
-          </a:ln>
-        </p:spPr>
-        <p:style>
-          <a:lnRef idx="1">
-            <a:schemeClr val="dk1"/>
-          </a:lnRef>
-          <a:fillRef idx="0">
-            <a:schemeClr val="dk1"/>
-          </a:fillRef>
-          <a:effectRef idx="0">
-            <a:schemeClr val="dk1"/>
-          </a:effectRef>
-          <a:fontRef idx="minor">
-            <a:schemeClr val="tx1"/>
-          </a:fontRef>
-        </p:style>
-      </p:cxnSp>
-      <p:cxnSp>
-        <p:nvCxnSpPr>
-          <p:cNvPr id="107" name="Conector de Seta Reta 106"/>
-          <p:cNvCxnSpPr/>
-          <p:nvPr/>
-        </p:nvCxnSpPr>
-        <p:spPr>
-          <a:xfrm flipH="1" flipV="1">
-            <a:off x="3683785" y="6711504"/>
-            <a:ext cx="188395" cy="197163"/>
-          </a:xfrm>
-          <a:prstGeom prst="straightConnector1">
-            <a:avLst/>
-          </a:prstGeom>
-          <a:ln>
-            <a:tailEnd type="triangle"/>
-          </a:ln>
-        </p:spPr>
-        <p:style>
-          <a:lnRef idx="1">
-            <a:schemeClr val="dk1"/>
-          </a:lnRef>
-          <a:fillRef idx="0">
-            <a:schemeClr val="dk1"/>
-          </a:fillRef>
-          <a:effectRef idx="0">
             <a:schemeClr val="dk1"/>
           </a:effectRef>
           <a:fontRef idx="minor">
@@ -5450,11 +4342,11 @@
           <p:nvPr/>
         </p:nvPicPr>
         <p:blipFill>
-          <a:blip r:embed="rId13">
+          <a:blip r:embed="rId11">
             <a:extLst>
               <a:ext uri="{BEBA8EAE-BF5A-486C-A8C5-ECC9F3942E4B}">
                 <a14:imgProps xmlns:a14="http://schemas.microsoft.com/office/drawing/2010/main">
-                  <a14:imgLayer r:embed="rId14">
+                  <a14:imgLayer r:embed="rId12">
                     <a14:imgEffect>
                       <a14:backgroundRemoval t="0" b="100000" l="0" r="100000">
                         <a14:foregroundMark x1="43000" y1="21645" x2="84000" y2="39394"/>
@@ -5471,78 +4363,417 @@
         </p:blipFill>
         <p:spPr>
           <a:xfrm>
-            <a:off x="5403459" y="11159479"/>
-            <a:ext cx="345794" cy="399391"/>
+            <a:off x="9008251" y="12054191"/>
+            <a:ext cx="447774" cy="517178"/>
           </a:xfrm>
           <a:prstGeom prst="rect">
             <a:avLst/>
           </a:prstGeom>
         </p:spPr>
       </p:pic>
-      <p:sp>
-        <p:nvSpPr>
-          <p:cNvPr id="113" name="Retângulo 112"/>
-          <p:cNvSpPr/>
+      <p:cxnSp>
+        <p:nvCxnSpPr>
+          <p:cNvPr id="69" name="Conector de Seta Reta 68"/>
+          <p:cNvCxnSpPr/>
           <p:nvPr/>
-        </p:nvSpPr>
-        <p:spPr>
-          <a:xfrm>
-            <a:off x="3623081" y="3633515"/>
-            <a:ext cx="2621093" cy="843002"/>
+        </p:nvCxnSpPr>
+        <p:spPr>
+          <a:xfrm flipV="1">
+            <a:off x="3515143" y="5347976"/>
+            <a:ext cx="598220" cy="437954"/>
+          </a:xfrm>
+          <a:prstGeom prst="straightConnector1">
+            <a:avLst/>
+          </a:prstGeom>
+          <a:ln w="76200">
+            <a:tailEnd type="triangle"/>
+          </a:ln>
+        </p:spPr>
+        <p:style>
+          <a:lnRef idx="3">
+            <a:schemeClr val="dk1"/>
+          </a:lnRef>
+          <a:fillRef idx="0">
+            <a:schemeClr val="dk1"/>
+          </a:fillRef>
+          <a:effectRef idx="2">
+            <a:schemeClr val="dk1"/>
+          </a:effectRef>
+          <a:fontRef idx="minor">
+            <a:schemeClr val="tx1"/>
+          </a:fontRef>
+        </p:style>
+      </p:cxnSp>
+      <p:cxnSp>
+        <p:nvCxnSpPr>
+          <p:cNvPr id="70" name="Conector de Seta Reta 69"/>
+          <p:cNvCxnSpPr/>
+          <p:nvPr/>
+        </p:nvCxnSpPr>
+        <p:spPr>
+          <a:xfrm flipV="1">
+            <a:off x="6845767" y="8407797"/>
+            <a:ext cx="0" cy="1244089"/>
+          </a:xfrm>
+          <a:prstGeom prst="straightConnector1">
+            <a:avLst/>
+          </a:prstGeom>
+          <a:ln w="76200">
+            <a:solidFill>
+              <a:schemeClr val="tx1"/>
+            </a:solidFill>
+            <a:tailEnd type="triangle"/>
+          </a:ln>
+        </p:spPr>
+        <p:style>
+          <a:lnRef idx="1">
+            <a:schemeClr val="accent1"/>
+          </a:lnRef>
+          <a:fillRef idx="0">
+            <a:schemeClr val="accent1"/>
+          </a:fillRef>
+          <a:effectRef idx="0">
+            <a:schemeClr val="accent1"/>
+          </a:effectRef>
+          <a:fontRef idx="minor">
+            <a:schemeClr val="tx1"/>
+          </a:fontRef>
+        </p:style>
+      </p:cxnSp>
+      <p:pic>
+        <p:nvPicPr>
+          <p:cNvPr id="90" name="Imagem 89"/>
+          <p:cNvPicPr>
+            <a:picLocks noChangeAspect="1"/>
+          </p:cNvPicPr>
+          <p:nvPr/>
+        </p:nvPicPr>
+        <p:blipFill rotWithShape="1">
+          <a:blip r:embed="rId17">
+            <a:extLst>
+              <a:ext uri="{BEBA8EAE-BF5A-486C-A8C5-ECC9F3942E4B}">
+                <a14:imgProps xmlns:a14="http://schemas.microsoft.com/office/drawing/2010/main">
+                  <a14:imgLayer r:embed="rId18">
+                    <a14:imgEffect>
+                      <a14:backgroundRemoval t="9961" b="89844" l="3711" r="94141"/>
+                    </a14:imgEffect>
+                  </a14:imgLayer>
+                </a14:imgProps>
+              </a:ext>
+              <a:ext uri="{28A0092B-C50C-407E-A947-70E740481C1C}">
+                <a14:useLocalDpi xmlns:a14="http://schemas.microsoft.com/office/drawing/2010/main" val="0"/>
+              </a:ext>
+            </a:extLst>
+          </a:blip>
+          <a:srcRect l="5427" t="23699" b="24881"/>
+          <a:stretch/>
+        </p:blipFill>
+        <p:spPr>
+          <a:xfrm>
+            <a:off x="533000" y="3547028"/>
+            <a:ext cx="8827820" cy="4799750"/>
           </a:xfrm>
           <a:prstGeom prst="rect">
             <a:avLst/>
           </a:prstGeom>
-          <a:noFill/>
-          <a:ln w="9525" cap="flat" cmpd="sng" algn="ctr">
+        </p:spPr>
+      </p:pic>
+      <p:cxnSp>
+        <p:nvCxnSpPr>
+          <p:cNvPr id="101" name="Conector de Seta Reta 100"/>
+          <p:cNvCxnSpPr/>
+          <p:nvPr/>
+        </p:nvCxnSpPr>
+        <p:spPr>
+          <a:xfrm>
+            <a:off x="7531768" y="8424019"/>
+            <a:ext cx="8021" cy="1227867"/>
+          </a:xfrm>
+          <a:prstGeom prst="straightConnector1">
+            <a:avLst/>
+          </a:prstGeom>
+          <a:ln w="76200">
             <a:solidFill>
-              <a:schemeClr val="dk1"/>
+              <a:schemeClr val="tx1"/>
             </a:solidFill>
-            <a:prstDash val="solid"/>
-            <a:round/>
-            <a:headEnd type="none" w="med" len="med"/>
-            <a:tailEnd type="none" w="med" len="med"/>
+            <a:tailEnd type="triangle"/>
           </a:ln>
         </p:spPr>
         <p:style>
-          <a:lnRef idx="0">
-            <a:scrgbClr r="0" g="0" b="0"/>
+          <a:lnRef idx="1">
+            <a:schemeClr val="accent1"/>
           </a:lnRef>
           <a:fillRef idx="0">
-            <a:scrgbClr r="0" g="0" b="0"/>
+            <a:schemeClr val="accent1"/>
           </a:fillRef>
           <a:effectRef idx="0">
-            <a:scrgbClr r="0" g="0" b="0"/>
+            <a:schemeClr val="accent1"/>
           </a:effectRef>
           <a:fontRef idx="minor">
-            <a:schemeClr val="dk1"/>
+            <a:schemeClr val="tx1"/>
           </a:fontRef>
         </p:style>
-        <p:txBody>
-          <a:bodyPr rtlCol="0" anchor="ctr"/>
-          <a:lstStyle/>
-          <a:p>
-            <a:pPr algn="ctr"/>
-            <a:r>
-              <a:rPr lang="pt-BR" sz="1600" dirty="0" smtClean="0"/>
-              <a:t>Comunicação inversa Node </a:t>
-            </a:r>
-            <a:r>
-              <a:rPr lang="pt-BR" sz="1600" dirty="0" err="1"/>
-              <a:t>J</a:t>
-            </a:r>
-            <a:r>
-              <a:rPr lang="pt-BR" sz="1600" dirty="0" err="1" smtClean="0"/>
-              <a:t>s</a:t>
-            </a:r>
-            <a:r>
-              <a:rPr lang="pt-BR" sz="1600" dirty="0" smtClean="0"/>
-              <a:t>/Rede Local</a:t>
-            </a:r>
-            <a:endParaRPr lang="pt-BR" sz="1600" dirty="0"/>
-          </a:p>
-        </p:txBody>
-      </p:sp>
+      </p:cxnSp>
+      <p:cxnSp>
+        <p:nvCxnSpPr>
+          <p:cNvPr id="125" name="Conector de Seta Reta 124"/>
+          <p:cNvCxnSpPr/>
+          <p:nvPr/>
+        </p:nvCxnSpPr>
+        <p:spPr>
+          <a:xfrm flipH="1" flipV="1">
+            <a:off x="6530783" y="12360802"/>
+            <a:ext cx="1379099" cy="16708"/>
+          </a:xfrm>
+          <a:prstGeom prst="straightConnector1">
+            <a:avLst/>
+          </a:prstGeom>
+          <a:ln w="28575">
+            <a:solidFill>
+              <a:schemeClr val="tx1"/>
+            </a:solidFill>
+            <a:tailEnd type="triangle"/>
+          </a:ln>
+        </p:spPr>
+        <p:style>
+          <a:lnRef idx="1">
+            <a:schemeClr val="accent1"/>
+          </a:lnRef>
+          <a:fillRef idx="0">
+            <a:schemeClr val="accent1"/>
+          </a:fillRef>
+          <a:effectRef idx="0">
+            <a:schemeClr val="accent1"/>
+          </a:effectRef>
+          <a:fontRef idx="minor">
+            <a:schemeClr val="tx1"/>
+          </a:fontRef>
+        </p:style>
+      </p:cxnSp>
+      <p:cxnSp>
+        <p:nvCxnSpPr>
+          <p:cNvPr id="135" name="Conector de Seta Reta 134"/>
+          <p:cNvCxnSpPr/>
+          <p:nvPr/>
+        </p:nvCxnSpPr>
+        <p:spPr>
+          <a:xfrm>
+            <a:off x="6460118" y="12679463"/>
+            <a:ext cx="1559885" cy="20042"/>
+          </a:xfrm>
+          <a:prstGeom prst="straightConnector1">
+            <a:avLst/>
+          </a:prstGeom>
+          <a:ln w="28575">
+            <a:solidFill>
+              <a:schemeClr val="tx1"/>
+            </a:solidFill>
+            <a:tailEnd type="triangle"/>
+          </a:ln>
+        </p:spPr>
+        <p:style>
+          <a:lnRef idx="1">
+            <a:schemeClr val="accent1"/>
+          </a:lnRef>
+          <a:fillRef idx="0">
+            <a:schemeClr val="accent1"/>
+          </a:fillRef>
+          <a:effectRef idx="0">
+            <a:schemeClr val="accent1"/>
+          </a:effectRef>
+          <a:fontRef idx="minor">
+            <a:schemeClr val="tx1"/>
+          </a:fontRef>
+        </p:style>
+      </p:cxnSp>
+      <p:cxnSp>
+        <p:nvCxnSpPr>
+          <p:cNvPr id="141" name="Conector de Seta Reta 140"/>
+          <p:cNvCxnSpPr/>
+          <p:nvPr/>
+        </p:nvCxnSpPr>
+        <p:spPr>
+          <a:xfrm>
+            <a:off x="10381982" y="12630126"/>
+            <a:ext cx="1559885" cy="20042"/>
+          </a:xfrm>
+          <a:prstGeom prst="straightConnector1">
+            <a:avLst/>
+          </a:prstGeom>
+          <a:ln w="28575">
+            <a:solidFill>
+              <a:schemeClr val="tx1"/>
+            </a:solidFill>
+            <a:tailEnd type="triangle"/>
+          </a:ln>
+        </p:spPr>
+        <p:style>
+          <a:lnRef idx="1">
+            <a:schemeClr val="accent1"/>
+          </a:lnRef>
+          <a:fillRef idx="0">
+            <a:schemeClr val="accent1"/>
+          </a:fillRef>
+          <a:effectRef idx="0">
+            <a:schemeClr val="accent1"/>
+          </a:effectRef>
+          <a:fontRef idx="minor">
+            <a:schemeClr val="tx1"/>
+          </a:fontRef>
+        </p:style>
+      </p:cxnSp>
+      <p:cxnSp>
+        <p:nvCxnSpPr>
+          <p:cNvPr id="142" name="Conector de Seta Reta 141"/>
+          <p:cNvCxnSpPr/>
+          <p:nvPr/>
+        </p:nvCxnSpPr>
+        <p:spPr>
+          <a:xfrm flipH="1" flipV="1">
+            <a:off x="10381982" y="12299852"/>
+            <a:ext cx="1379099" cy="16708"/>
+          </a:xfrm>
+          <a:prstGeom prst="straightConnector1">
+            <a:avLst/>
+          </a:prstGeom>
+          <a:ln w="28575">
+            <a:solidFill>
+              <a:schemeClr val="tx1"/>
+            </a:solidFill>
+            <a:tailEnd type="triangle"/>
+          </a:ln>
+        </p:spPr>
+        <p:style>
+          <a:lnRef idx="1">
+            <a:schemeClr val="accent1"/>
+          </a:lnRef>
+          <a:fillRef idx="0">
+            <a:schemeClr val="accent1"/>
+          </a:fillRef>
+          <a:effectRef idx="0">
+            <a:schemeClr val="accent1"/>
+          </a:effectRef>
+          <a:fontRef idx="minor">
+            <a:schemeClr val="tx1"/>
+          </a:fontRef>
+        </p:style>
+      </p:cxnSp>
+      <p:cxnSp>
+        <p:nvCxnSpPr>
+          <p:cNvPr id="143" name="Conector de Seta Reta 142"/>
+          <p:cNvCxnSpPr/>
+          <p:nvPr/>
+        </p:nvCxnSpPr>
+        <p:spPr>
+          <a:xfrm flipH="1" flipV="1">
+            <a:off x="15631125" y="12235312"/>
+            <a:ext cx="1379099" cy="16708"/>
+          </a:xfrm>
+          <a:prstGeom prst="straightConnector1">
+            <a:avLst/>
+          </a:prstGeom>
+          <a:ln w="28575">
+            <a:solidFill>
+              <a:schemeClr val="tx1"/>
+            </a:solidFill>
+            <a:tailEnd type="triangle"/>
+          </a:ln>
+        </p:spPr>
+        <p:style>
+          <a:lnRef idx="1">
+            <a:schemeClr val="accent1"/>
+          </a:lnRef>
+          <a:fillRef idx="0">
+            <a:schemeClr val="accent1"/>
+          </a:fillRef>
+          <a:effectRef idx="0">
+            <a:schemeClr val="accent1"/>
+          </a:effectRef>
+          <a:fontRef idx="minor">
+            <a:schemeClr val="tx1"/>
+          </a:fontRef>
+        </p:style>
+      </p:cxnSp>
+      <p:cxnSp>
+        <p:nvCxnSpPr>
+          <p:cNvPr id="144" name="Conector de Seta Reta 143"/>
+          <p:cNvCxnSpPr/>
+          <p:nvPr/>
+        </p:nvCxnSpPr>
+        <p:spPr>
+          <a:xfrm>
+            <a:off x="15559815" y="12752848"/>
+            <a:ext cx="1559885" cy="20042"/>
+          </a:xfrm>
+          <a:prstGeom prst="straightConnector1">
+            <a:avLst/>
+          </a:prstGeom>
+          <a:ln w="28575">
+            <a:solidFill>
+              <a:schemeClr val="tx1"/>
+            </a:solidFill>
+            <a:tailEnd type="triangle"/>
+          </a:ln>
+        </p:spPr>
+        <p:style>
+          <a:lnRef idx="1">
+            <a:schemeClr val="accent1"/>
+          </a:lnRef>
+          <a:fillRef idx="0">
+            <a:schemeClr val="accent1"/>
+          </a:fillRef>
+          <a:effectRef idx="0">
+            <a:schemeClr val="accent1"/>
+          </a:effectRef>
+          <a:fontRef idx="minor">
+            <a:schemeClr val="tx1"/>
+          </a:fontRef>
+        </p:style>
+      </p:cxnSp>
+      <p:cxnSp>
+        <p:nvCxnSpPr>
+          <p:cNvPr id="150" name="Conector de Seta Reta 149">
+            <a:extLst>
+              <a:ext uri="{FF2B5EF4-FFF2-40B4-BE49-F238E27FC236}">
+                <a16:creationId xmlns:a16="http://schemas.microsoft.com/office/drawing/2014/main" id="{DAB823FA-DDB4-4D8D-88D9-90488631C715}"/>
+              </a:ext>
+            </a:extLst>
+          </p:cNvPr>
+          <p:cNvCxnSpPr>
+            <a:cxnSpLocks/>
+          </p:cNvCxnSpPr>
+          <p:nvPr/>
+        </p:nvCxnSpPr>
+        <p:spPr>
+          <a:xfrm flipV="1">
+            <a:off x="7669405" y="3547028"/>
+            <a:ext cx="1338846" cy="1276067"/>
+          </a:xfrm>
+          <a:prstGeom prst="straightConnector1">
+            <a:avLst/>
+          </a:prstGeom>
+          <a:ln w="76200">
+            <a:solidFill>
+              <a:schemeClr val="tx1"/>
+            </a:solidFill>
+            <a:tailEnd type="triangle"/>
+          </a:ln>
+        </p:spPr>
+        <p:style>
+          <a:lnRef idx="3">
+            <a:schemeClr val="dk1"/>
+          </a:lnRef>
+          <a:fillRef idx="0">
+            <a:schemeClr val="dk1"/>
+          </a:fillRef>
+          <a:effectRef idx="2">
+            <a:schemeClr val="dk1"/>
+          </a:effectRef>
+          <a:fontRef idx="minor">
+            <a:schemeClr val="tx1"/>
+          </a:fontRef>
+        </p:style>
+      </p:cxnSp>
     </p:spTree>
     <p:extLst>
       <p:ext uri="{BB962C8B-B14F-4D97-AF65-F5344CB8AC3E}">
@@ -5553,6 +4784,13 @@
   <p:clrMapOvr>
     <a:masterClrMapping/>
   </p:clrMapOvr>
+  <p:timing>
+    <p:tnLst>
+      <p:par>
+        <p:cTn id="1" dur="indefinite" restart="never" nodeType="tmRoot"/>
+      </p:par>
+    </p:tnLst>
+  </p:timing>
 </p:sld>
 </file>
 

</xml_diff>